<commit_message>
text about fork instance, example not quite accurate yet
</commit_message>
<xml_diff>
--- a/images/images-fork-exmp.pptx
+++ b/images/images-fork-exmp.pptx
@@ -3387,10 +3387,13 @@
           <a:p>
             <a:pPr algn="ctr"/>
             <a:r>
-              <a:rPr lang="en-US" dirty="0"/>
+              <a:rPr lang="en-US" sz="1400" dirty="0"/>
+              <a:t>w</a:t>
+            </a:r>
+            <a:r>
+              <a:rPr lang="en-US" sz="1400" baseline="-25000" dirty="0"/>
               <a:t>0</a:t>
             </a:r>
-            <a:endParaRPr lang="en-US" baseline="-25000" dirty="0"/>
           </a:p>
         </p:txBody>
       </p:sp>
@@ -6252,7 +6255,7 @@
         <p:spPr>
           <a:xfrm>
             <a:off x="1639712" y="713232"/>
-            <a:ext cx="5974264" cy="923330"/>
+            <a:ext cx="9309856" cy="923330"/>
           </a:xfrm>
           <a:prstGeom prst="rect">
             <a:avLst/>
@@ -6271,11 +6274,11 @@
             </a:r>
             <a:r>
               <a:rPr lang="en-US" dirty="0" err="1"/>
-              <a:t>c+nk</a:t>
+              <a:t>c+n</a:t>
             </a:r>
             <a:r>
               <a:rPr lang="en-US" dirty="0"/>
-              <a:t>/2,</a:t>
+              <a:t>(k+2)/2,</a:t>
             </a:r>
           </a:p>
           <a:p>
@@ -6295,7 +6298,7 @@
           <a:p>
             <a:r>
               <a:rPr lang="en-US" dirty="0"/>
-              <a:t>For c=0: gap to optimality = k, which can be arbitrarily large</a:t>
+              <a:t>For c=0: gap to optimality = k, which can become arbitrarily large if we scale “10” accordingly</a:t>
             </a:r>
           </a:p>
         </p:txBody>

</xml_diff>

<commit_message>
power point figures updated
</commit_message>
<xml_diff>
--- a/images/images-fork-exmp.pptx
+++ b/images/images-fork-exmp.pptx
@@ -7,7 +7,6 @@
   <p:sldIdLst>
     <p:sldId id="258" r:id="rId2"/>
     <p:sldId id="257" r:id="rId3"/>
-    <p:sldId id="259" r:id="rId4"/>
   </p:sldIdLst>
   <p:sldSz cx="12192000" cy="6858000"/>
   <p:notesSz cx="6858000" cy="9144000"/>
@@ -3440,19 +3439,137 @@
           <a:p>
             <a:pPr algn="ctr"/>
             <a:r>
-              <a:rPr lang="en-US" sz="1500" dirty="0"/>
-              <a:t>10</a:t>
-            </a:r>
-            <a:endParaRPr lang="en-US" sz="1500" baseline="-25000" dirty="0"/>
-          </a:p>
-        </p:txBody>
-      </p:sp>
-      <p:sp>
-        <p:nvSpPr>
-          <p:cNvPr id="4" name="Oval 3">
-            <a:extLst>
-              <a:ext uri="{FF2B5EF4-FFF2-40B4-BE49-F238E27FC236}">
-                <a16:creationId xmlns:a16="http://schemas.microsoft.com/office/drawing/2014/main" id="{6545E9B5-773A-FAEF-F49F-739065093F61}"/>
+              <a:rPr lang="en-US" sz="1500" dirty="0">
+                <a:ea typeface="Tahoma" panose="020B0604030504040204" pitchFamily="34" charset="0"/>
+                <a:cs typeface="Tahoma" panose="020B0604030504040204" pitchFamily="34" charset="0"/>
+              </a:rPr>
+              <a:t>k</a:t>
+            </a:r>
+          </a:p>
+        </p:txBody>
+      </p:sp>
+      <mc:AlternateContent xmlns:mc="http://schemas.openxmlformats.org/markup-compatibility/2006">
+        <mc:Choice xmlns:a14="http://schemas.microsoft.com/office/drawing/2010/main" Requires="a14">
+          <p:sp>
+            <p:nvSpPr>
+              <p:cNvPr id="4" name="Oval 3">
+                <a:extLst>
+                  <a:ext uri="{FF2B5EF4-FFF2-40B4-BE49-F238E27FC236}">
+                    <a16:creationId xmlns:a16="http://schemas.microsoft.com/office/drawing/2014/main" id="{6545E9B5-773A-FAEF-F49F-739065093F61}"/>
+                  </a:ext>
+                </a:extLst>
+              </p:cNvPr>
+              <p:cNvSpPr/>
+              <p:nvPr/>
+            </p:nvSpPr>
+            <p:spPr>
+              <a:xfrm>
+                <a:off x="7583095" y="2355574"/>
+                <a:ext cx="555171" cy="555171"/>
+              </a:xfrm>
+              <a:prstGeom prst="ellipse">
+                <a:avLst/>
+              </a:prstGeom>
+            </p:spPr>
+            <p:style>
+              <a:lnRef idx="2">
+                <a:schemeClr val="accent1">
+                  <a:shade val="15000"/>
+                </a:schemeClr>
+              </a:lnRef>
+              <a:fillRef idx="1">
+                <a:schemeClr val="accent1"/>
+              </a:fillRef>
+              <a:effectRef idx="0">
+                <a:schemeClr val="accent1"/>
+              </a:effectRef>
+              <a:fontRef idx="minor">
+                <a:schemeClr val="lt1"/>
+              </a:fontRef>
+            </p:style>
+            <p:txBody>
+              <a:bodyPr rtlCol="0" anchor="ctr"/>
+              <a:lstStyle/>
+              <a:p>
+                <a:pPr algn="ctr"/>
+                <a:r>
+                  <a:rPr lang="en-US" sz="1500" dirty="0"/>
+                  <a:t>1+</a:t>
+                </a:r>
+                <a:br>
+                  <a:rPr lang="en-US" sz="1500" dirty="0"/>
+                </a:br>
+                <a14:m>
+                  <m:oMathPara xmlns:m="http://schemas.openxmlformats.org/officeDocument/2006/math">
+                    <m:oMathParaPr>
+                      <m:jc m:val="centerGroup"/>
+                    </m:oMathParaPr>
+                    <m:oMath xmlns:m="http://schemas.openxmlformats.org/officeDocument/2006/math">
+                      <m:r>
+                        <a:rPr lang="en-US" sz="1500" b="0" i="1" smtClean="0">
+                          <a:latin typeface="Cambria Math" panose="02040503050406030204" pitchFamily="18" charset="0"/>
+                        </a:rPr>
+                        <m:t>𝜖</m:t>
+                      </m:r>
+                    </m:oMath>
+                  </m:oMathPara>
+                </a14:m>
+                <a:endParaRPr lang="en-US" sz="1500" dirty="0"/>
+              </a:p>
+            </p:txBody>
+          </p:sp>
+        </mc:Choice>
+        <mc:Fallback>
+          <p:sp>
+            <p:nvSpPr>
+              <p:cNvPr id="4" name="Oval 3">
+                <a:extLst>
+                  <a:ext uri="{FF2B5EF4-FFF2-40B4-BE49-F238E27FC236}">
+                    <a16:creationId xmlns:a16="http://schemas.microsoft.com/office/drawing/2014/main" id="{6545E9B5-773A-FAEF-F49F-739065093F61}"/>
+                  </a:ext>
+                </a:extLst>
+              </p:cNvPr>
+              <p:cNvSpPr>
+                <a:spLocks noRot="1" noChangeAspect="1" noMove="1" noResize="1" noEditPoints="1" noAdjustHandles="1" noChangeArrowheads="1" noChangeShapeType="1" noTextEdit="1"/>
+              </p:cNvSpPr>
+              <p:nvPr/>
+            </p:nvSpPr>
+            <p:spPr>
+              <a:xfrm>
+                <a:off x="7583095" y="2355574"/>
+                <a:ext cx="555171" cy="555171"/>
+              </a:xfrm>
+              <a:prstGeom prst="ellipse">
+                <a:avLst/>
+              </a:prstGeom>
+              <a:blipFill>
+                <a:blip r:embed="rId2"/>
+                <a:stretch>
+                  <a:fillRect/>
+                </a:stretch>
+              </a:blipFill>
+            </p:spPr>
+            <p:txBody>
+              <a:bodyPr/>
+              <a:lstStyle/>
+              <a:p>
+                <a:r>
+                  <a:rPr lang="en-US">
+                    <a:noFill/>
+                  </a:rPr>
+                  <a:t> </a:t>
+                </a:r>
+              </a:p>
+            </p:txBody>
+          </p:sp>
+        </mc:Fallback>
+      </mc:AlternateContent>
+      <p:sp>
+        <p:nvSpPr>
+          <p:cNvPr id="5" name="Oval 4">
+            <a:extLst>
+              <a:ext uri="{FF2B5EF4-FFF2-40B4-BE49-F238E27FC236}">
+                <a16:creationId xmlns:a16="http://schemas.microsoft.com/office/drawing/2014/main" id="{CB03E5F8-3BC5-73EF-3072-0F2B2F90598D}"/>
               </a:ext>
             </a:extLst>
           </p:cNvPr>
@@ -3461,7 +3578,7 @@
         </p:nvSpPr>
         <p:spPr>
           <a:xfrm>
-            <a:off x="7583095" y="2355574"/>
+            <a:off x="8366865" y="2355573"/>
             <a:ext cx="555171" cy="555171"/>
           </a:xfrm>
           <a:prstGeom prst="ellipse">
@@ -3496,106 +3613,122 @@
           </a:p>
         </p:txBody>
       </p:sp>
-      <p:sp>
-        <p:nvSpPr>
-          <p:cNvPr id="5" name="Oval 4">
-            <a:extLst>
-              <a:ext uri="{FF2B5EF4-FFF2-40B4-BE49-F238E27FC236}">
-                <a16:creationId xmlns:a16="http://schemas.microsoft.com/office/drawing/2014/main" id="{CB03E5F8-3BC5-73EF-3072-0F2B2F90598D}"/>
-              </a:ext>
-            </a:extLst>
-          </p:cNvPr>
-          <p:cNvSpPr/>
-          <p:nvPr/>
-        </p:nvSpPr>
-        <p:spPr>
-          <a:xfrm>
-            <a:off x="8366865" y="2355573"/>
-            <a:ext cx="555171" cy="555171"/>
-          </a:xfrm>
-          <a:prstGeom prst="ellipse">
-            <a:avLst/>
-          </a:prstGeom>
-        </p:spPr>
-        <p:style>
-          <a:lnRef idx="2">
-            <a:schemeClr val="accent1">
-              <a:shade val="15000"/>
-            </a:schemeClr>
-          </a:lnRef>
-          <a:fillRef idx="1">
-            <a:schemeClr val="accent1"/>
-          </a:fillRef>
-          <a:effectRef idx="0">
-            <a:schemeClr val="accent1"/>
-          </a:effectRef>
-          <a:fontRef idx="minor">
-            <a:schemeClr val="lt1"/>
-          </a:fontRef>
-        </p:style>
-        <p:txBody>
-          <a:bodyPr rtlCol="0" anchor="ctr"/>
-          <a:lstStyle/>
-          <a:p>
-            <a:pPr algn="ctr"/>
-            <a:r>
-              <a:rPr lang="en-US" sz="1500" dirty="0"/>
-              <a:t>10</a:t>
-            </a:r>
-            <a:endParaRPr lang="en-US" sz="1500" baseline="-25000" dirty="0"/>
-          </a:p>
-        </p:txBody>
-      </p:sp>
-      <p:sp>
-        <p:nvSpPr>
-          <p:cNvPr id="6" name="Oval 5">
-            <a:extLst>
-              <a:ext uri="{FF2B5EF4-FFF2-40B4-BE49-F238E27FC236}">
-                <a16:creationId xmlns:a16="http://schemas.microsoft.com/office/drawing/2014/main" id="{7A13C32A-ECBD-EEF1-AFD3-555E9EE1E0C7}"/>
-              </a:ext>
-            </a:extLst>
-          </p:cNvPr>
-          <p:cNvSpPr/>
-          <p:nvPr/>
-        </p:nvSpPr>
-        <p:spPr>
-          <a:xfrm>
-            <a:off x="10523208" y="2355573"/>
-            <a:ext cx="555171" cy="555171"/>
-          </a:xfrm>
-          <a:prstGeom prst="ellipse">
-            <a:avLst/>
-          </a:prstGeom>
-        </p:spPr>
-        <p:style>
-          <a:lnRef idx="2">
-            <a:schemeClr val="accent1">
-              <a:shade val="15000"/>
-            </a:schemeClr>
-          </a:lnRef>
-          <a:fillRef idx="1">
-            <a:schemeClr val="accent1"/>
-          </a:fillRef>
-          <a:effectRef idx="0">
-            <a:schemeClr val="accent1"/>
-          </a:effectRef>
-          <a:fontRef idx="minor">
-            <a:schemeClr val="lt1"/>
-          </a:fontRef>
-        </p:style>
-        <p:txBody>
-          <a:bodyPr rtlCol="0" anchor="ctr"/>
-          <a:lstStyle/>
-          <a:p>
-            <a:pPr algn="ctr"/>
-            <a:r>
-              <a:rPr lang="en-US" sz="1500" dirty="0"/>
-              <a:t>k</a:t>
-            </a:r>
-            <a:endParaRPr lang="en-US" sz="1500" baseline="-25000" dirty="0"/>
-          </a:p>
-        </p:txBody>
-      </p:sp>
+      <mc:AlternateContent xmlns:mc="http://schemas.openxmlformats.org/markup-compatibility/2006">
+        <mc:Choice xmlns:a14="http://schemas.microsoft.com/office/drawing/2010/main" Requires="a14">
+          <p:sp>
+            <p:nvSpPr>
+              <p:cNvPr id="6" name="Oval 5">
+                <a:extLst>
+                  <a:ext uri="{FF2B5EF4-FFF2-40B4-BE49-F238E27FC236}">
+                    <a16:creationId xmlns:a16="http://schemas.microsoft.com/office/drawing/2014/main" id="{7A13C32A-ECBD-EEF1-AFD3-555E9EE1E0C7}"/>
+                  </a:ext>
+                </a:extLst>
+              </p:cNvPr>
+              <p:cNvSpPr/>
+              <p:nvPr/>
+            </p:nvSpPr>
+            <p:spPr>
+              <a:xfrm>
+                <a:off x="10523208" y="2355573"/>
+                <a:ext cx="555171" cy="555171"/>
+              </a:xfrm>
+              <a:prstGeom prst="ellipse">
+                <a:avLst/>
+              </a:prstGeom>
+            </p:spPr>
+            <p:style>
+              <a:lnRef idx="2">
+                <a:schemeClr val="accent1">
+                  <a:shade val="15000"/>
+                </a:schemeClr>
+              </a:lnRef>
+              <a:fillRef idx="1">
+                <a:schemeClr val="accent1"/>
+              </a:fillRef>
+              <a:effectRef idx="0">
+                <a:schemeClr val="accent1"/>
+              </a:effectRef>
+              <a:fontRef idx="minor">
+                <a:schemeClr val="lt1"/>
+              </a:fontRef>
+            </p:style>
+            <p:txBody>
+              <a:bodyPr rtlCol="0" anchor="ctr"/>
+              <a:lstStyle/>
+              <a:p>
+                <a:pPr algn="ctr"/>
+                <a:r>
+                  <a:rPr lang="en-US" sz="1500" dirty="0"/>
+                  <a:t>1+</a:t>
+                </a:r>
+                <a:br>
+                  <a:rPr lang="en-US" sz="1500" dirty="0"/>
+                </a:br>
+                <a14:m>
+                  <m:oMathPara xmlns:m="http://schemas.openxmlformats.org/officeDocument/2006/math">
+                    <m:oMathParaPr>
+                      <m:jc m:val="centerGroup"/>
+                    </m:oMathParaPr>
+                    <m:oMath xmlns:m="http://schemas.openxmlformats.org/officeDocument/2006/math">
+                      <m:r>
+                        <a:rPr lang="en-US" sz="1500" b="0" i="1" smtClean="0">
+                          <a:latin typeface="Cambria Math" panose="02040503050406030204" pitchFamily="18" charset="0"/>
+                        </a:rPr>
+                        <m:t>𝜖</m:t>
+                      </m:r>
+                    </m:oMath>
+                  </m:oMathPara>
+                </a14:m>
+                <a:endParaRPr lang="en-US" sz="1500" dirty="0"/>
+              </a:p>
+            </p:txBody>
+          </p:sp>
+        </mc:Choice>
+        <mc:Fallback>
+          <p:sp>
+            <p:nvSpPr>
+              <p:cNvPr id="6" name="Oval 5">
+                <a:extLst>
+                  <a:ext uri="{FF2B5EF4-FFF2-40B4-BE49-F238E27FC236}">
+                    <a16:creationId xmlns:a16="http://schemas.microsoft.com/office/drawing/2014/main" id="{7A13C32A-ECBD-EEF1-AFD3-555E9EE1E0C7}"/>
+                  </a:ext>
+                </a:extLst>
+              </p:cNvPr>
+              <p:cNvSpPr>
+                <a:spLocks noRot="1" noChangeAspect="1" noMove="1" noResize="1" noEditPoints="1" noAdjustHandles="1" noChangeArrowheads="1" noChangeShapeType="1" noTextEdit="1"/>
+              </p:cNvSpPr>
+              <p:nvPr/>
+            </p:nvSpPr>
+            <p:spPr>
+              <a:xfrm>
+                <a:off x="10523208" y="2355573"/>
+                <a:ext cx="555171" cy="555171"/>
+              </a:xfrm>
+              <a:prstGeom prst="ellipse">
+                <a:avLst/>
+              </a:prstGeom>
+              <a:blipFill>
+                <a:blip r:embed="rId3"/>
+                <a:stretch>
+                  <a:fillRect/>
+                </a:stretch>
+              </a:blipFill>
+            </p:spPr>
+            <p:txBody>
+              <a:bodyPr/>
+              <a:lstStyle/>
+              <a:p>
+                <a:r>
+                  <a:rPr lang="en-US">
+                    <a:noFill/>
+                  </a:rPr>
+                  <a:t> </a:t>
+                </a:r>
+              </a:p>
+            </p:txBody>
+          </p:sp>
+        </mc:Fallback>
+      </mc:AlternateContent>
       <p:cxnSp>
         <p:nvCxnSpPr>
           <p:cNvPr id="7" name="Gerade Verbindung mit Pfeil 6">
@@ -3902,12 +4035,471 @@
           </a:p>
         </p:txBody>
       </p:sp>
-      <p:sp>
-        <p:nvSpPr>
-          <p:cNvPr id="14" name="Textfeld 13">
-            <a:extLst>
-              <a:ext uri="{FF2B5EF4-FFF2-40B4-BE49-F238E27FC236}">
-                <a16:creationId xmlns:a16="http://schemas.microsoft.com/office/drawing/2014/main" id="{90505533-401C-3EF1-2459-B5C74BCCB6DE}"/>
+      <mc:AlternateContent xmlns:mc="http://schemas.openxmlformats.org/markup-compatibility/2006">
+        <mc:Choice xmlns:a14="http://schemas.microsoft.com/office/drawing/2010/main" Requires="a14">
+          <p:sp>
+            <p:nvSpPr>
+              <p:cNvPr id="14" name="Textfeld 13">
+                <a:extLst>
+                  <a:ext uri="{FF2B5EF4-FFF2-40B4-BE49-F238E27FC236}">
+                    <a16:creationId xmlns:a16="http://schemas.microsoft.com/office/drawing/2014/main" id="{90505533-401C-3EF1-2459-B5C74BCCB6DE}"/>
+                  </a:ext>
+                </a:extLst>
+              </p:cNvPr>
+              <p:cNvSpPr txBox="1"/>
+              <p:nvPr/>
+            </p:nvSpPr>
+            <p:spPr>
+              <a:xfrm>
+                <a:off x="9265682" y="1860497"/>
+                <a:ext cx="460511" cy="453137"/>
+              </a:xfrm>
+              <a:prstGeom prst="rect">
+                <a:avLst/>
+              </a:prstGeom>
+              <a:noFill/>
+              <a:ln>
+                <a:noFill/>
+              </a:ln>
+            </p:spPr>
+            <p:txBody>
+              <a:bodyPr wrap="none" rtlCol="0">
+                <a:spAutoFit/>
+              </a:bodyPr>
+              <a:lstStyle/>
+              <a:p>
+                <a:r>
+                  <a:rPr lang="en-US" sz="2400" baseline="-25000" dirty="0"/>
+                  <a:t>k-</a:t>
+                </a:r>
+                <a14:m>
+                  <m:oMath xmlns:m="http://schemas.openxmlformats.org/officeDocument/2006/math">
+                    <m:r>
+                      <a:rPr lang="en-US" sz="2400" b="0" i="1" baseline="-25000" smtClean="0">
+                        <a:latin typeface="Cambria Math" panose="02040503050406030204" pitchFamily="18" charset="0"/>
+                      </a:rPr>
+                      <m:t>𝜖</m:t>
+                    </m:r>
+                  </m:oMath>
+                </a14:m>
+                <a:endParaRPr lang="en-US" sz="2400" baseline="-25000" dirty="0"/>
+              </a:p>
+            </p:txBody>
+          </p:sp>
+        </mc:Choice>
+        <mc:Fallback>
+          <p:sp>
+            <p:nvSpPr>
+              <p:cNvPr id="14" name="Textfeld 13">
+                <a:extLst>
+                  <a:ext uri="{FF2B5EF4-FFF2-40B4-BE49-F238E27FC236}">
+                    <a16:creationId xmlns:a16="http://schemas.microsoft.com/office/drawing/2014/main" id="{90505533-401C-3EF1-2459-B5C74BCCB6DE}"/>
+                  </a:ext>
+                </a:extLst>
+              </p:cNvPr>
+              <p:cNvSpPr txBox="1">
+                <a:spLocks noRot="1" noChangeAspect="1" noMove="1" noResize="1" noEditPoints="1" noAdjustHandles="1" noChangeArrowheads="1" noChangeShapeType="1" noTextEdit="1"/>
+              </p:cNvSpPr>
+              <p:nvPr/>
+            </p:nvSpPr>
+            <p:spPr>
+              <a:xfrm>
+                <a:off x="9265682" y="1860497"/>
+                <a:ext cx="460511" cy="453137"/>
+              </a:xfrm>
+              <a:prstGeom prst="rect">
+                <a:avLst/>
+              </a:prstGeom>
+              <a:blipFill>
+                <a:blip r:embed="rId4"/>
+                <a:stretch>
+                  <a:fillRect l="-5263" b="-24324"/>
+                </a:stretch>
+              </a:blipFill>
+              <a:ln>
+                <a:noFill/>
+              </a:ln>
+            </p:spPr>
+            <p:txBody>
+              <a:bodyPr/>
+              <a:lstStyle/>
+              <a:p>
+                <a:r>
+                  <a:rPr lang="en-US">
+                    <a:noFill/>
+                  </a:rPr>
+                  <a:t> </a:t>
+                </a:r>
+              </a:p>
+            </p:txBody>
+          </p:sp>
+        </mc:Fallback>
+      </mc:AlternateContent>
+      <mc:AlternateContent xmlns:mc="http://schemas.openxmlformats.org/markup-compatibility/2006">
+        <mc:Choice xmlns:a14="http://schemas.microsoft.com/office/drawing/2010/main" Requires="a14">
+          <p:sp>
+            <p:nvSpPr>
+              <p:cNvPr id="15" name="Textfeld 14">
+                <a:extLst>
+                  <a:ext uri="{FF2B5EF4-FFF2-40B4-BE49-F238E27FC236}">
+                    <a16:creationId xmlns:a16="http://schemas.microsoft.com/office/drawing/2014/main" id="{2B950F5F-A7C4-1CAA-6C7B-7726B4E1B530}"/>
+                  </a:ext>
+                </a:extLst>
+              </p:cNvPr>
+              <p:cNvSpPr txBox="1"/>
+              <p:nvPr/>
+            </p:nvSpPr>
+            <p:spPr>
+              <a:xfrm>
+                <a:off x="7915065" y="1948513"/>
+                <a:ext cx="460511" cy="453137"/>
+              </a:xfrm>
+              <a:prstGeom prst="rect">
+                <a:avLst/>
+              </a:prstGeom>
+              <a:noFill/>
+              <a:ln>
+                <a:noFill/>
+              </a:ln>
+            </p:spPr>
+            <p:txBody>
+              <a:bodyPr wrap="none" rtlCol="0">
+                <a:spAutoFit/>
+              </a:bodyPr>
+              <a:lstStyle/>
+              <a:p>
+                <a:r>
+                  <a:rPr lang="en-US" sz="2400" baseline="-25000" dirty="0"/>
+                  <a:t>k-</a:t>
+                </a:r>
+                <a14:m>
+                  <m:oMath xmlns:m="http://schemas.openxmlformats.org/officeDocument/2006/math">
+                    <m:r>
+                      <a:rPr lang="en-US" sz="2400" b="0" i="1" baseline="-25000" smtClean="0">
+                        <a:latin typeface="Cambria Math" panose="02040503050406030204" pitchFamily="18" charset="0"/>
+                      </a:rPr>
+                      <m:t>𝜖</m:t>
+                    </m:r>
+                  </m:oMath>
+                </a14:m>
+                <a:endParaRPr lang="en-US" sz="2400" baseline="-25000" dirty="0"/>
+              </a:p>
+            </p:txBody>
+          </p:sp>
+        </mc:Choice>
+        <mc:Fallback>
+          <p:sp>
+            <p:nvSpPr>
+              <p:cNvPr id="15" name="Textfeld 14">
+                <a:extLst>
+                  <a:ext uri="{FF2B5EF4-FFF2-40B4-BE49-F238E27FC236}">
+                    <a16:creationId xmlns:a16="http://schemas.microsoft.com/office/drawing/2014/main" id="{2B950F5F-A7C4-1CAA-6C7B-7726B4E1B530}"/>
+                  </a:ext>
+                </a:extLst>
+              </p:cNvPr>
+              <p:cNvSpPr txBox="1">
+                <a:spLocks noRot="1" noChangeAspect="1" noMove="1" noResize="1" noEditPoints="1" noAdjustHandles="1" noChangeArrowheads="1" noChangeShapeType="1" noTextEdit="1"/>
+              </p:cNvSpPr>
+              <p:nvPr/>
+            </p:nvSpPr>
+            <p:spPr>
+              <a:xfrm>
+                <a:off x="7915065" y="1948513"/>
+                <a:ext cx="460511" cy="453137"/>
+              </a:xfrm>
+              <a:prstGeom prst="rect">
+                <a:avLst/>
+              </a:prstGeom>
+              <a:blipFill>
+                <a:blip r:embed="rId5"/>
+                <a:stretch>
+                  <a:fillRect l="-8108" b="-24324"/>
+                </a:stretch>
+              </a:blipFill>
+              <a:ln>
+                <a:noFill/>
+              </a:ln>
+            </p:spPr>
+            <p:txBody>
+              <a:bodyPr/>
+              <a:lstStyle/>
+              <a:p>
+                <a:r>
+                  <a:rPr lang="en-US">
+                    <a:noFill/>
+                  </a:rPr>
+                  <a:t> </a:t>
+                </a:r>
+              </a:p>
+            </p:txBody>
+          </p:sp>
+        </mc:Fallback>
+      </mc:AlternateContent>
+      <mc:AlternateContent xmlns:mc="http://schemas.openxmlformats.org/markup-compatibility/2006">
+        <mc:Choice xmlns:a14="http://schemas.microsoft.com/office/drawing/2010/main" Requires="a14">
+          <p:sp>
+            <p:nvSpPr>
+              <p:cNvPr id="16" name="Oval 15">
+                <a:extLst>
+                  <a:ext uri="{FF2B5EF4-FFF2-40B4-BE49-F238E27FC236}">
+                    <a16:creationId xmlns:a16="http://schemas.microsoft.com/office/drawing/2014/main" id="{F7974BB7-1996-647C-89F3-C9C6C5E5BB35}"/>
+                  </a:ext>
+                </a:extLst>
+              </p:cNvPr>
+              <p:cNvSpPr/>
+              <p:nvPr/>
+            </p:nvSpPr>
+            <p:spPr>
+              <a:xfrm>
+                <a:off x="9122565" y="2345655"/>
+                <a:ext cx="555171" cy="555171"/>
+              </a:xfrm>
+              <a:prstGeom prst="ellipse">
+                <a:avLst/>
+              </a:prstGeom>
+            </p:spPr>
+            <p:style>
+              <a:lnRef idx="2">
+                <a:schemeClr val="accent1">
+                  <a:shade val="15000"/>
+                </a:schemeClr>
+              </a:lnRef>
+              <a:fillRef idx="1">
+                <a:schemeClr val="accent1"/>
+              </a:fillRef>
+              <a:effectRef idx="0">
+                <a:schemeClr val="accent1"/>
+              </a:effectRef>
+              <a:fontRef idx="minor">
+                <a:schemeClr val="lt1"/>
+              </a:fontRef>
+            </p:style>
+            <p:txBody>
+              <a:bodyPr rtlCol="0" anchor="ctr"/>
+              <a:lstStyle/>
+              <a:p>
+                <a:pPr algn="ctr"/>
+                <a:r>
+                  <a:rPr lang="en-US" sz="1500" dirty="0"/>
+                  <a:t>1+</a:t>
+                </a:r>
+                <a:br>
+                  <a:rPr lang="en-US" sz="1500" dirty="0"/>
+                </a:br>
+                <a14:m>
+                  <m:oMathPara xmlns:m="http://schemas.openxmlformats.org/officeDocument/2006/math">
+                    <m:oMathParaPr>
+                      <m:jc m:val="centerGroup"/>
+                    </m:oMathParaPr>
+                    <m:oMath xmlns:m="http://schemas.openxmlformats.org/officeDocument/2006/math">
+                      <m:r>
+                        <a:rPr lang="en-US" sz="1500" b="0" i="1" smtClean="0">
+                          <a:latin typeface="Cambria Math" panose="02040503050406030204" pitchFamily="18" charset="0"/>
+                        </a:rPr>
+                        <m:t>𝜖</m:t>
+                      </m:r>
+                    </m:oMath>
+                  </m:oMathPara>
+                </a14:m>
+                <a:endParaRPr lang="en-US" sz="1500" dirty="0"/>
+              </a:p>
+            </p:txBody>
+          </p:sp>
+        </mc:Choice>
+        <mc:Fallback>
+          <p:sp>
+            <p:nvSpPr>
+              <p:cNvPr id="16" name="Oval 15">
+                <a:extLst>
+                  <a:ext uri="{FF2B5EF4-FFF2-40B4-BE49-F238E27FC236}">
+                    <a16:creationId xmlns:a16="http://schemas.microsoft.com/office/drawing/2014/main" id="{F7974BB7-1996-647C-89F3-C9C6C5E5BB35}"/>
+                  </a:ext>
+                </a:extLst>
+              </p:cNvPr>
+              <p:cNvSpPr>
+                <a:spLocks noRot="1" noChangeAspect="1" noMove="1" noResize="1" noEditPoints="1" noAdjustHandles="1" noChangeArrowheads="1" noChangeShapeType="1" noTextEdit="1"/>
+              </p:cNvSpPr>
+              <p:nvPr/>
+            </p:nvSpPr>
+            <p:spPr>
+              <a:xfrm>
+                <a:off x="9122565" y="2345655"/>
+                <a:ext cx="555171" cy="555171"/>
+              </a:xfrm>
+              <a:prstGeom prst="ellipse">
+                <a:avLst/>
+              </a:prstGeom>
+              <a:blipFill>
+                <a:blip r:embed="rId6"/>
+                <a:stretch>
+                  <a:fillRect t="-2174"/>
+                </a:stretch>
+              </a:blipFill>
+            </p:spPr>
+            <p:txBody>
+              <a:bodyPr/>
+              <a:lstStyle/>
+              <a:p>
+                <a:r>
+                  <a:rPr lang="en-US">
+                    <a:noFill/>
+                  </a:rPr>
+                  <a:t> </a:t>
+                </a:r>
+              </a:p>
+            </p:txBody>
+          </p:sp>
+        </mc:Fallback>
+      </mc:AlternateContent>
+      <p:cxnSp>
+        <p:nvCxnSpPr>
+          <p:cNvPr id="17" name="Gerade Verbindung mit Pfeil 16">
+            <a:extLst>
+              <a:ext uri="{FF2B5EF4-FFF2-40B4-BE49-F238E27FC236}">
+                <a16:creationId xmlns:a16="http://schemas.microsoft.com/office/drawing/2014/main" id="{A982EBF3-5030-CA6B-823F-98DAFFB40228}"/>
+              </a:ext>
+            </a:extLst>
+          </p:cNvPr>
+          <p:cNvCxnSpPr>
+            <a:cxnSpLocks/>
+            <a:stCxn id="2" idx="5"/>
+            <a:endCxn id="16" idx="0"/>
+          </p:cNvCxnSpPr>
+          <p:nvPr/>
+        </p:nvCxnSpPr>
+        <p:spPr>
+          <a:xfrm>
+            <a:off x="8481507" y="1599356"/>
+            <a:ext cx="918644" cy="746299"/>
+          </a:xfrm>
+          <a:prstGeom prst="straightConnector1">
+            <a:avLst/>
+          </a:prstGeom>
+          <a:ln w="25400">
+            <a:tailEnd type="arrow" w="med" len="lg"/>
+          </a:ln>
+        </p:spPr>
+        <p:style>
+          <a:lnRef idx="2">
+            <a:schemeClr val="accent1"/>
+          </a:lnRef>
+          <a:fillRef idx="0">
+            <a:schemeClr val="accent1"/>
+          </a:fillRef>
+          <a:effectRef idx="1">
+            <a:schemeClr val="accent1"/>
+          </a:effectRef>
+          <a:fontRef idx="minor">
+            <a:schemeClr val="tx1"/>
+          </a:fontRef>
+        </p:style>
+      </p:cxnSp>
+      <mc:AlternateContent xmlns:mc="http://schemas.openxmlformats.org/markup-compatibility/2006">
+        <mc:Choice xmlns:a14="http://schemas.microsoft.com/office/drawing/2010/main" Requires="a14">
+          <p:sp>
+            <p:nvSpPr>
+              <p:cNvPr id="18" name="Textfeld 17">
+                <a:extLst>
+                  <a:ext uri="{FF2B5EF4-FFF2-40B4-BE49-F238E27FC236}">
+                    <a16:creationId xmlns:a16="http://schemas.microsoft.com/office/drawing/2014/main" id="{A95D469C-1969-64DD-07C2-DE5AC44924C3}"/>
+                  </a:ext>
+                </a:extLst>
+              </p:cNvPr>
+              <p:cNvSpPr txBox="1"/>
+              <p:nvPr/>
+            </p:nvSpPr>
+            <p:spPr>
+              <a:xfrm>
+                <a:off x="10624595" y="1885549"/>
+                <a:ext cx="460511" cy="453137"/>
+              </a:xfrm>
+              <a:prstGeom prst="rect">
+                <a:avLst/>
+              </a:prstGeom>
+              <a:noFill/>
+              <a:ln>
+                <a:noFill/>
+              </a:ln>
+            </p:spPr>
+            <p:txBody>
+              <a:bodyPr wrap="none" rtlCol="0">
+                <a:spAutoFit/>
+              </a:bodyPr>
+              <a:lstStyle/>
+              <a:p>
+                <a:r>
+                  <a:rPr lang="en-US" sz="2400" baseline="-25000" dirty="0"/>
+                  <a:t>k-</a:t>
+                </a:r>
+                <a14:m>
+                  <m:oMath xmlns:m="http://schemas.openxmlformats.org/officeDocument/2006/math">
+                    <m:r>
+                      <a:rPr lang="en-US" sz="2400" b="0" i="1" baseline="-25000" smtClean="0">
+                        <a:latin typeface="Cambria Math" panose="02040503050406030204" pitchFamily="18" charset="0"/>
+                      </a:rPr>
+                      <m:t>𝜖</m:t>
+                    </m:r>
+                  </m:oMath>
+                </a14:m>
+                <a:endParaRPr lang="en-US" sz="2400" baseline="-25000" dirty="0"/>
+              </a:p>
+            </p:txBody>
+          </p:sp>
+        </mc:Choice>
+        <mc:Fallback>
+          <p:sp>
+            <p:nvSpPr>
+              <p:cNvPr id="18" name="Textfeld 17">
+                <a:extLst>
+                  <a:ext uri="{FF2B5EF4-FFF2-40B4-BE49-F238E27FC236}">
+                    <a16:creationId xmlns:a16="http://schemas.microsoft.com/office/drawing/2014/main" id="{A95D469C-1969-64DD-07C2-DE5AC44924C3}"/>
+                  </a:ext>
+                </a:extLst>
+              </p:cNvPr>
+              <p:cNvSpPr txBox="1">
+                <a:spLocks noRot="1" noChangeAspect="1" noMove="1" noResize="1" noEditPoints="1" noAdjustHandles="1" noChangeArrowheads="1" noChangeShapeType="1" noTextEdit="1"/>
+              </p:cNvSpPr>
+              <p:nvPr/>
+            </p:nvSpPr>
+            <p:spPr>
+              <a:xfrm>
+                <a:off x="10624595" y="1885549"/>
+                <a:ext cx="460511" cy="453137"/>
+              </a:xfrm>
+              <a:prstGeom prst="rect">
+                <a:avLst/>
+              </a:prstGeom>
+              <a:blipFill>
+                <a:blip r:embed="rId7"/>
+                <a:stretch>
+                  <a:fillRect l="-5405" b="-24324"/>
+                </a:stretch>
+              </a:blipFill>
+              <a:ln>
+                <a:noFill/>
+              </a:ln>
+            </p:spPr>
+            <p:txBody>
+              <a:bodyPr/>
+              <a:lstStyle/>
+              <a:p>
+                <a:r>
+                  <a:rPr lang="en-US">
+                    <a:noFill/>
+                  </a:rPr>
+                  <a:t> </a:t>
+                </a:r>
+              </a:p>
+            </p:txBody>
+          </p:sp>
+        </mc:Fallback>
+      </mc:AlternateContent>
+      <p:sp>
+        <p:nvSpPr>
+          <p:cNvPr id="19" name="Textfeld 18">
+            <a:extLst>
+              <a:ext uri="{FF2B5EF4-FFF2-40B4-BE49-F238E27FC236}">
+                <a16:creationId xmlns:a16="http://schemas.microsoft.com/office/drawing/2014/main" id="{3F34CA9B-2EC5-04AF-DF37-488ED5738786}"/>
               </a:ext>
             </a:extLst>
           </p:cNvPr>
@@ -3916,8 +4508,242 @@
         </p:nvSpPr>
         <p:spPr>
           <a:xfrm>
-            <a:off x="9265682" y="1860497"/>
-            <a:ext cx="402674" cy="338554"/>
+            <a:off x="6856338" y="3065861"/>
+            <a:ext cx="441146" cy="461665"/>
+          </a:xfrm>
+          <a:prstGeom prst="rect">
+            <a:avLst/>
+          </a:prstGeom>
+          <a:noFill/>
+        </p:spPr>
+        <p:txBody>
+          <a:bodyPr wrap="none" rtlCol="0">
+            <a:spAutoFit/>
+          </a:bodyPr>
+          <a:lstStyle/>
+          <a:p>
+            <a:r>
+              <a:rPr lang="en-US" sz="2400" dirty="0"/>
+              <a:t>T</a:t>
+            </a:r>
+            <a:r>
+              <a:rPr lang="en-US" sz="2400" baseline="-25000" dirty="0"/>
+              <a:t>1</a:t>
+            </a:r>
+          </a:p>
+        </p:txBody>
+      </p:sp>
+      <p:sp>
+        <p:nvSpPr>
+          <p:cNvPr id="20" name="Textfeld 19">
+            <a:extLst>
+              <a:ext uri="{FF2B5EF4-FFF2-40B4-BE49-F238E27FC236}">
+                <a16:creationId xmlns:a16="http://schemas.microsoft.com/office/drawing/2014/main" id="{34CD2C78-69F1-83BA-7E42-97257499BF9A}"/>
+              </a:ext>
+            </a:extLst>
+          </p:cNvPr>
+          <p:cNvSpPr txBox="1"/>
+          <p:nvPr/>
+        </p:nvSpPr>
+        <p:spPr>
+          <a:xfrm>
+            <a:off x="7640107" y="3049510"/>
+            <a:ext cx="441146" cy="461665"/>
+          </a:xfrm>
+          <a:prstGeom prst="rect">
+            <a:avLst/>
+          </a:prstGeom>
+          <a:noFill/>
+        </p:spPr>
+        <p:txBody>
+          <a:bodyPr wrap="none" rtlCol="0">
+            <a:spAutoFit/>
+          </a:bodyPr>
+          <a:lstStyle/>
+          <a:p>
+            <a:r>
+              <a:rPr lang="en-US" sz="2400" dirty="0"/>
+              <a:t>T</a:t>
+            </a:r>
+            <a:r>
+              <a:rPr lang="en-US" sz="2400" baseline="-25000" dirty="0"/>
+              <a:t>2</a:t>
+            </a:r>
+          </a:p>
+        </p:txBody>
+      </p:sp>
+      <p:sp>
+        <p:nvSpPr>
+          <p:cNvPr id="21" name="Textfeld 20">
+            <a:extLst>
+              <a:ext uri="{FF2B5EF4-FFF2-40B4-BE49-F238E27FC236}">
+                <a16:creationId xmlns:a16="http://schemas.microsoft.com/office/drawing/2014/main" id="{E589B002-63D6-A225-00E5-9BBA02D025A6}"/>
+              </a:ext>
+            </a:extLst>
+          </p:cNvPr>
+          <p:cNvSpPr txBox="1"/>
+          <p:nvPr/>
+        </p:nvSpPr>
+        <p:spPr>
+          <a:xfrm>
+            <a:off x="8423876" y="3033159"/>
+            <a:ext cx="441146" cy="461665"/>
+          </a:xfrm>
+          <a:prstGeom prst="rect">
+            <a:avLst/>
+          </a:prstGeom>
+          <a:noFill/>
+        </p:spPr>
+        <p:txBody>
+          <a:bodyPr wrap="none" rtlCol="0">
+            <a:spAutoFit/>
+          </a:bodyPr>
+          <a:lstStyle/>
+          <a:p>
+            <a:r>
+              <a:rPr lang="en-US" sz="2400" dirty="0"/>
+              <a:t>T</a:t>
+            </a:r>
+            <a:r>
+              <a:rPr lang="en-US" sz="2400" baseline="-25000" dirty="0"/>
+              <a:t>3</a:t>
+            </a:r>
+          </a:p>
+        </p:txBody>
+      </p:sp>
+      <p:sp>
+        <p:nvSpPr>
+          <p:cNvPr id="22" name="Textfeld 21">
+            <a:extLst>
+              <a:ext uri="{FF2B5EF4-FFF2-40B4-BE49-F238E27FC236}">
+                <a16:creationId xmlns:a16="http://schemas.microsoft.com/office/drawing/2014/main" id="{AB77B721-F406-FC41-DF59-060DCF2A09CE}"/>
+              </a:ext>
+            </a:extLst>
+          </p:cNvPr>
+          <p:cNvSpPr txBox="1"/>
+          <p:nvPr/>
+        </p:nvSpPr>
+        <p:spPr>
+          <a:xfrm>
+            <a:off x="9207645" y="3016808"/>
+            <a:ext cx="441146" cy="461665"/>
+          </a:xfrm>
+          <a:prstGeom prst="rect">
+            <a:avLst/>
+          </a:prstGeom>
+          <a:noFill/>
+        </p:spPr>
+        <p:txBody>
+          <a:bodyPr wrap="none" rtlCol="0">
+            <a:spAutoFit/>
+          </a:bodyPr>
+          <a:lstStyle/>
+          <a:p>
+            <a:r>
+              <a:rPr lang="en-US" sz="2400" dirty="0"/>
+              <a:t>T</a:t>
+            </a:r>
+            <a:r>
+              <a:rPr lang="en-US" sz="2400" baseline="-25000" dirty="0"/>
+              <a:t>4</a:t>
+            </a:r>
+          </a:p>
+        </p:txBody>
+      </p:sp>
+      <p:sp>
+        <p:nvSpPr>
+          <p:cNvPr id="23" name="Textfeld 22">
+            <a:extLst>
+              <a:ext uri="{FF2B5EF4-FFF2-40B4-BE49-F238E27FC236}">
+                <a16:creationId xmlns:a16="http://schemas.microsoft.com/office/drawing/2014/main" id="{FC3C6312-53E2-796D-A991-8F3D7193F952}"/>
+              </a:ext>
+            </a:extLst>
+          </p:cNvPr>
+          <p:cNvSpPr txBox="1"/>
+          <p:nvPr/>
+        </p:nvSpPr>
+        <p:spPr>
+          <a:xfrm>
+            <a:off x="10580220" y="2992110"/>
+            <a:ext cx="432106" cy="461665"/>
+          </a:xfrm>
+          <a:prstGeom prst="rect">
+            <a:avLst/>
+          </a:prstGeom>
+          <a:noFill/>
+        </p:spPr>
+        <p:txBody>
+          <a:bodyPr wrap="none" rtlCol="0">
+            <a:spAutoFit/>
+          </a:bodyPr>
+          <a:lstStyle/>
+          <a:p>
+            <a:r>
+              <a:rPr lang="en-US" sz="2400" dirty="0"/>
+              <a:t>T</a:t>
+            </a:r>
+            <a:r>
+              <a:rPr lang="en-US" sz="2400" baseline="-25000" dirty="0"/>
+              <a:t>n</a:t>
+            </a:r>
+          </a:p>
+        </p:txBody>
+      </p:sp>
+      <p:sp>
+        <p:nvSpPr>
+          <p:cNvPr id="24" name="Textfeld 23">
+            <a:extLst>
+              <a:ext uri="{FF2B5EF4-FFF2-40B4-BE49-F238E27FC236}">
+                <a16:creationId xmlns:a16="http://schemas.microsoft.com/office/drawing/2014/main" id="{7246FA8B-E128-09C0-373F-AF99DBCF3F9A}"/>
+              </a:ext>
+            </a:extLst>
+          </p:cNvPr>
+          <p:cNvSpPr txBox="1"/>
+          <p:nvPr/>
+        </p:nvSpPr>
+        <p:spPr>
+          <a:xfrm>
+            <a:off x="8064651" y="637105"/>
+            <a:ext cx="441146" cy="461665"/>
+          </a:xfrm>
+          <a:prstGeom prst="rect">
+            <a:avLst/>
+          </a:prstGeom>
+          <a:noFill/>
+        </p:spPr>
+        <p:txBody>
+          <a:bodyPr wrap="none" rtlCol="0">
+            <a:spAutoFit/>
+          </a:bodyPr>
+          <a:lstStyle/>
+          <a:p>
+            <a:r>
+              <a:rPr lang="en-US" sz="2400" dirty="0"/>
+              <a:t>T</a:t>
+            </a:r>
+            <a:r>
+              <a:rPr lang="en-US" sz="2400" baseline="-25000" dirty="0"/>
+              <a:t>0</a:t>
+            </a:r>
+          </a:p>
+        </p:txBody>
+      </p:sp>
+      <p:sp>
+        <p:nvSpPr>
+          <p:cNvPr id="25" name="Textfeld 24">
+            <a:extLst>
+              <a:ext uri="{FF2B5EF4-FFF2-40B4-BE49-F238E27FC236}">
+                <a16:creationId xmlns:a16="http://schemas.microsoft.com/office/drawing/2014/main" id="{BD6FA755-7A2B-ABD9-405D-81825D1A4FE0}"/>
+              </a:ext>
+            </a:extLst>
+          </p:cNvPr>
+          <p:cNvSpPr txBox="1"/>
+          <p:nvPr/>
+        </p:nvSpPr>
+        <p:spPr>
+          <a:xfrm>
+            <a:off x="7065385" y="1825341"/>
+            <a:ext cx="293670" cy="338554"/>
           </a:xfrm>
           <a:prstGeom prst="rect">
             <a:avLst/>
@@ -3935,17 +4761,17 @@
           <a:p>
             <a:r>
               <a:rPr lang="en-US" sz="2400" baseline="-25000" dirty="0"/>
-              <a:t>10</a:t>
-            </a:r>
-          </a:p>
-        </p:txBody>
-      </p:sp>
-      <p:sp>
-        <p:nvSpPr>
-          <p:cNvPr id="15" name="Textfeld 14">
-            <a:extLst>
-              <a:ext uri="{FF2B5EF4-FFF2-40B4-BE49-F238E27FC236}">
-                <a16:creationId xmlns:a16="http://schemas.microsoft.com/office/drawing/2014/main" id="{2B950F5F-A7C4-1CAA-6C7B-7726B4E1B530}"/>
+              <a:t>1</a:t>
+            </a:r>
+          </a:p>
+        </p:txBody>
+      </p:sp>
+      <p:sp>
+        <p:nvSpPr>
+          <p:cNvPr id="26" name="Textfeld 25">
+            <a:extLst>
+              <a:ext uri="{FF2B5EF4-FFF2-40B4-BE49-F238E27FC236}">
+                <a16:creationId xmlns:a16="http://schemas.microsoft.com/office/drawing/2014/main" id="{2B8D0237-75DB-EBB8-F8DC-37933E597269}"/>
               </a:ext>
             </a:extLst>
           </p:cNvPr>
@@ -3954,8 +4780,8 @@
         </p:nvSpPr>
         <p:spPr>
           <a:xfrm>
-            <a:off x="7915065" y="1948513"/>
-            <a:ext cx="402674" cy="338554"/>
+            <a:off x="8545092" y="1827042"/>
+            <a:ext cx="293670" cy="338554"/>
           </a:xfrm>
           <a:prstGeom prst="rect">
             <a:avLst/>
@@ -3973,17 +4799,624 @@
           <a:p>
             <a:r>
               <a:rPr lang="en-US" sz="2400" baseline="-25000" dirty="0"/>
-              <a:t>10</a:t>
-            </a:r>
-          </a:p>
-        </p:txBody>
-      </p:sp>
-      <p:sp>
-        <p:nvSpPr>
-          <p:cNvPr id="16" name="Oval 15">
-            <a:extLst>
-              <a:ext uri="{FF2B5EF4-FFF2-40B4-BE49-F238E27FC236}">
-                <a16:creationId xmlns:a16="http://schemas.microsoft.com/office/drawing/2014/main" id="{F7974BB7-1996-647C-89F3-C9C6C5E5BB35}"/>
+              <a:t>1</a:t>
+            </a:r>
+          </a:p>
+        </p:txBody>
+      </p:sp>
+      <p:sp>
+        <p:nvSpPr>
+          <p:cNvPr id="27" name="Textfeld 26">
+            <a:extLst>
+              <a:ext uri="{FF2B5EF4-FFF2-40B4-BE49-F238E27FC236}">
+                <a16:creationId xmlns:a16="http://schemas.microsoft.com/office/drawing/2014/main" id="{B4472F40-F91C-7DE5-0D3D-9853F85706FA}"/>
+              </a:ext>
+            </a:extLst>
+          </p:cNvPr>
+          <p:cNvSpPr txBox="1"/>
+          <p:nvPr/>
+        </p:nvSpPr>
+        <p:spPr>
+          <a:xfrm>
+            <a:off x="641811" y="3220681"/>
+            <a:ext cx="399468" cy="369332"/>
+          </a:xfrm>
+          <a:prstGeom prst="rect">
+            <a:avLst/>
+          </a:prstGeom>
+          <a:noFill/>
+        </p:spPr>
+        <p:txBody>
+          <a:bodyPr wrap="none" rtlCol="0">
+            <a:spAutoFit/>
+          </a:bodyPr>
+          <a:lstStyle/>
+          <a:p>
+            <a:r>
+              <a:rPr lang="en-US" dirty="0"/>
+              <a:t>P</a:t>
+            </a:r>
+            <a:r>
+              <a:rPr lang="en-US" baseline="-25000" dirty="0"/>
+              <a:t>1</a:t>
+            </a:r>
+          </a:p>
+        </p:txBody>
+      </p:sp>
+      <p:sp>
+        <p:nvSpPr>
+          <p:cNvPr id="28" name="Textfeld 27">
+            <a:extLst>
+              <a:ext uri="{FF2B5EF4-FFF2-40B4-BE49-F238E27FC236}">
+                <a16:creationId xmlns:a16="http://schemas.microsoft.com/office/drawing/2014/main" id="{EE5AFD4C-A622-A78C-91ED-5BD31E63D91E}"/>
+              </a:ext>
+            </a:extLst>
+          </p:cNvPr>
+          <p:cNvSpPr txBox="1"/>
+          <p:nvPr/>
+        </p:nvSpPr>
+        <p:spPr>
+          <a:xfrm>
+            <a:off x="641811" y="3994349"/>
+            <a:ext cx="399468" cy="369332"/>
+          </a:xfrm>
+          <a:prstGeom prst="rect">
+            <a:avLst/>
+          </a:prstGeom>
+          <a:noFill/>
+        </p:spPr>
+        <p:txBody>
+          <a:bodyPr wrap="none" rtlCol="0">
+            <a:spAutoFit/>
+          </a:bodyPr>
+          <a:lstStyle/>
+          <a:p>
+            <a:r>
+              <a:rPr lang="en-US" dirty="0"/>
+              <a:t>P</a:t>
+            </a:r>
+            <a:r>
+              <a:rPr lang="en-US" baseline="-25000" dirty="0"/>
+              <a:t>2</a:t>
+            </a:r>
+          </a:p>
+        </p:txBody>
+      </p:sp>
+      <p:sp>
+        <p:nvSpPr>
+          <p:cNvPr id="29" name="Textfeld 28">
+            <a:extLst>
+              <a:ext uri="{FF2B5EF4-FFF2-40B4-BE49-F238E27FC236}">
+                <a16:creationId xmlns:a16="http://schemas.microsoft.com/office/drawing/2014/main" id="{104DC533-2A4F-99CB-D6ED-A163E1186543}"/>
+              </a:ext>
+            </a:extLst>
+          </p:cNvPr>
+          <p:cNvSpPr txBox="1"/>
+          <p:nvPr/>
+        </p:nvSpPr>
+        <p:spPr>
+          <a:xfrm>
+            <a:off x="1222548" y="3231566"/>
+            <a:ext cx="375946" cy="369332"/>
+          </a:xfrm>
+          <a:prstGeom prst="rect">
+            <a:avLst/>
+          </a:prstGeom>
+          <a:noFill/>
+          <a:ln w="19050">
+            <a:solidFill>
+              <a:schemeClr val="accent1"/>
+            </a:solidFill>
+          </a:ln>
+        </p:spPr>
+        <p:txBody>
+          <a:bodyPr wrap="square" rtlCol="0">
+            <a:spAutoFit/>
+          </a:bodyPr>
+          <a:lstStyle/>
+          <a:p>
+            <a:r>
+              <a:rPr lang="en-US" dirty="0"/>
+              <a:t>T</a:t>
+            </a:r>
+            <a:r>
+              <a:rPr lang="en-US" baseline="-25000" dirty="0"/>
+              <a:t>0</a:t>
+            </a:r>
+          </a:p>
+        </p:txBody>
+      </p:sp>
+      <p:sp>
+        <p:nvSpPr>
+          <p:cNvPr id="30" name="Textfeld 29">
+            <a:extLst>
+              <a:ext uri="{FF2B5EF4-FFF2-40B4-BE49-F238E27FC236}">
+                <a16:creationId xmlns:a16="http://schemas.microsoft.com/office/drawing/2014/main" id="{5576125C-3AE3-246C-A8EB-75E8D8B78C0D}"/>
+              </a:ext>
+            </a:extLst>
+          </p:cNvPr>
+          <p:cNvSpPr txBox="1"/>
+          <p:nvPr/>
+        </p:nvSpPr>
+        <p:spPr>
+          <a:xfrm>
+            <a:off x="2100205" y="3994349"/>
+            <a:ext cx="1238966" cy="369332"/>
+          </a:xfrm>
+          <a:prstGeom prst="rect">
+            <a:avLst/>
+          </a:prstGeom>
+          <a:noFill/>
+          <a:ln w="19050">
+            <a:solidFill>
+              <a:schemeClr val="accent1"/>
+            </a:solidFill>
+          </a:ln>
+        </p:spPr>
+        <p:txBody>
+          <a:bodyPr wrap="square" rtlCol="0">
+            <a:spAutoFit/>
+          </a:bodyPr>
+          <a:lstStyle/>
+          <a:p>
+            <a:r>
+              <a:rPr lang="en-US" dirty="0"/>
+              <a:t>T</a:t>
+            </a:r>
+            <a:r>
+              <a:rPr lang="en-US" baseline="-25000" dirty="0"/>
+              <a:t>1</a:t>
+            </a:r>
+          </a:p>
+        </p:txBody>
+      </p:sp>
+      <p:sp>
+        <p:nvSpPr>
+          <p:cNvPr id="31" name="Textfeld 30">
+            <a:extLst>
+              <a:ext uri="{FF2B5EF4-FFF2-40B4-BE49-F238E27FC236}">
+                <a16:creationId xmlns:a16="http://schemas.microsoft.com/office/drawing/2014/main" id="{589552CC-86F8-62A4-F327-906B879F35B9}"/>
+              </a:ext>
+            </a:extLst>
+          </p:cNvPr>
+          <p:cNvSpPr txBox="1"/>
+          <p:nvPr/>
+        </p:nvSpPr>
+        <p:spPr>
+          <a:xfrm>
+            <a:off x="641811" y="4768017"/>
+            <a:ext cx="399468" cy="369332"/>
+          </a:xfrm>
+          <a:prstGeom prst="rect">
+            <a:avLst/>
+          </a:prstGeom>
+          <a:noFill/>
+        </p:spPr>
+        <p:txBody>
+          <a:bodyPr wrap="none" rtlCol="0">
+            <a:spAutoFit/>
+          </a:bodyPr>
+          <a:lstStyle/>
+          <a:p>
+            <a:r>
+              <a:rPr lang="en-US" dirty="0"/>
+              <a:t>P</a:t>
+            </a:r>
+            <a:r>
+              <a:rPr lang="en-US" baseline="-25000" dirty="0"/>
+              <a:t>3</a:t>
+            </a:r>
+          </a:p>
+        </p:txBody>
+      </p:sp>
+      <p:sp>
+        <p:nvSpPr>
+          <p:cNvPr id="32" name="Textfeld 31">
+            <a:extLst>
+              <a:ext uri="{FF2B5EF4-FFF2-40B4-BE49-F238E27FC236}">
+                <a16:creationId xmlns:a16="http://schemas.microsoft.com/office/drawing/2014/main" id="{C9F5C589-B132-64BD-1A76-634FA6BD841C}"/>
+              </a:ext>
+            </a:extLst>
+          </p:cNvPr>
+          <p:cNvSpPr txBox="1"/>
+          <p:nvPr/>
+        </p:nvSpPr>
+        <p:spPr>
+          <a:xfrm>
+            <a:off x="694003" y="5408931"/>
+            <a:ext cx="399468" cy="369332"/>
+          </a:xfrm>
+          <a:prstGeom prst="rect">
+            <a:avLst/>
+          </a:prstGeom>
+          <a:noFill/>
+        </p:spPr>
+        <p:txBody>
+          <a:bodyPr wrap="none" rtlCol="0">
+            <a:spAutoFit/>
+          </a:bodyPr>
+          <a:lstStyle/>
+          <a:p>
+            <a:r>
+              <a:rPr lang="en-US" dirty="0"/>
+              <a:t>P</a:t>
+            </a:r>
+            <a:r>
+              <a:rPr lang="en-US" baseline="-25000" dirty="0"/>
+              <a:t>4</a:t>
+            </a:r>
+          </a:p>
+        </p:txBody>
+      </p:sp>
+      <p:sp>
+        <p:nvSpPr>
+          <p:cNvPr id="33" name="Textfeld 32">
+            <a:extLst>
+              <a:ext uri="{FF2B5EF4-FFF2-40B4-BE49-F238E27FC236}">
+                <a16:creationId xmlns:a16="http://schemas.microsoft.com/office/drawing/2014/main" id="{EC2ED61F-5B9E-D621-1AD5-853947B75439}"/>
+              </a:ext>
+            </a:extLst>
+          </p:cNvPr>
+          <p:cNvSpPr txBox="1"/>
+          <p:nvPr/>
+        </p:nvSpPr>
+        <p:spPr>
+          <a:xfrm>
+            <a:off x="1628419" y="3232304"/>
+            <a:ext cx="444876" cy="369332"/>
+          </a:xfrm>
+          <a:prstGeom prst="rect">
+            <a:avLst/>
+          </a:prstGeom>
+          <a:noFill/>
+          <a:ln w="19050">
+            <a:solidFill>
+              <a:schemeClr val="accent1"/>
+            </a:solidFill>
+          </a:ln>
+        </p:spPr>
+        <p:txBody>
+          <a:bodyPr wrap="square" rtlCol="0">
+            <a:spAutoFit/>
+          </a:bodyPr>
+          <a:lstStyle/>
+          <a:p>
+            <a:r>
+              <a:rPr lang="en-US" dirty="0"/>
+              <a:t>T</a:t>
+            </a:r>
+            <a:r>
+              <a:rPr lang="en-US" baseline="-25000" dirty="0"/>
+              <a:t>2</a:t>
+            </a:r>
+          </a:p>
+        </p:txBody>
+      </p:sp>
+      <p:sp>
+        <p:nvSpPr>
+          <p:cNvPr id="34" name="Textfeld 33">
+            <a:extLst>
+              <a:ext uri="{FF2B5EF4-FFF2-40B4-BE49-F238E27FC236}">
+                <a16:creationId xmlns:a16="http://schemas.microsoft.com/office/drawing/2014/main" id="{5756D624-C5B7-FCA6-7B35-C869DFFAB749}"/>
+              </a:ext>
+            </a:extLst>
+          </p:cNvPr>
+          <p:cNvSpPr txBox="1"/>
+          <p:nvPr/>
+        </p:nvSpPr>
+        <p:spPr>
+          <a:xfrm>
+            <a:off x="2578114" y="4761125"/>
+            <a:ext cx="1266665" cy="369332"/>
+          </a:xfrm>
+          <a:prstGeom prst="rect">
+            <a:avLst/>
+          </a:prstGeom>
+          <a:noFill/>
+          <a:ln w="19050">
+            <a:solidFill>
+              <a:schemeClr val="accent1"/>
+            </a:solidFill>
+          </a:ln>
+        </p:spPr>
+        <p:txBody>
+          <a:bodyPr wrap="square" rtlCol="0">
+            <a:spAutoFit/>
+          </a:bodyPr>
+          <a:lstStyle/>
+          <a:p>
+            <a:r>
+              <a:rPr lang="en-US" dirty="0"/>
+              <a:t>T</a:t>
+            </a:r>
+            <a:r>
+              <a:rPr lang="en-US" baseline="-25000" dirty="0"/>
+              <a:t>3</a:t>
+            </a:r>
+          </a:p>
+        </p:txBody>
+      </p:sp>
+      <p:sp>
+        <p:nvSpPr>
+          <p:cNvPr id="35" name="Textfeld 34">
+            <a:extLst>
+              <a:ext uri="{FF2B5EF4-FFF2-40B4-BE49-F238E27FC236}">
+                <a16:creationId xmlns:a16="http://schemas.microsoft.com/office/drawing/2014/main" id="{BC3B2059-19CA-0900-256F-7BF8DD1CA789}"/>
+              </a:ext>
+            </a:extLst>
+          </p:cNvPr>
+          <p:cNvSpPr txBox="1"/>
+          <p:nvPr/>
+        </p:nvSpPr>
+        <p:spPr>
+          <a:xfrm>
+            <a:off x="2097029" y="3231566"/>
+            <a:ext cx="398488" cy="369332"/>
+          </a:xfrm>
+          <a:prstGeom prst="rect">
+            <a:avLst/>
+          </a:prstGeom>
+          <a:noFill/>
+          <a:ln w="19050">
+            <a:solidFill>
+              <a:schemeClr val="accent1"/>
+            </a:solidFill>
+          </a:ln>
+        </p:spPr>
+        <p:txBody>
+          <a:bodyPr wrap="square" rtlCol="0">
+            <a:spAutoFit/>
+          </a:bodyPr>
+          <a:lstStyle/>
+          <a:p>
+            <a:r>
+              <a:rPr lang="en-US" dirty="0"/>
+              <a:t>T</a:t>
+            </a:r>
+            <a:r>
+              <a:rPr lang="en-US" baseline="-25000" dirty="0"/>
+              <a:t>4</a:t>
+            </a:r>
+          </a:p>
+        </p:txBody>
+      </p:sp>
+      <p:sp>
+        <p:nvSpPr>
+          <p:cNvPr id="36" name="Textfeld 35">
+            <a:extLst>
+              <a:ext uri="{FF2B5EF4-FFF2-40B4-BE49-F238E27FC236}">
+                <a16:creationId xmlns:a16="http://schemas.microsoft.com/office/drawing/2014/main" id="{67D1897B-F21E-F9CE-BE95-32D3EA029B59}"/>
+              </a:ext>
+            </a:extLst>
+          </p:cNvPr>
+          <p:cNvSpPr txBox="1"/>
+          <p:nvPr/>
+        </p:nvSpPr>
+        <p:spPr>
+          <a:xfrm>
+            <a:off x="3062307" y="5419360"/>
+            <a:ext cx="1230187" cy="369332"/>
+          </a:xfrm>
+          <a:prstGeom prst="rect">
+            <a:avLst/>
+          </a:prstGeom>
+          <a:noFill/>
+          <a:ln w="19050">
+            <a:solidFill>
+              <a:schemeClr val="accent1"/>
+            </a:solidFill>
+          </a:ln>
+        </p:spPr>
+        <p:txBody>
+          <a:bodyPr wrap="square" rtlCol="0">
+            <a:spAutoFit/>
+          </a:bodyPr>
+          <a:lstStyle/>
+          <a:p>
+            <a:r>
+              <a:rPr lang="en-US" dirty="0"/>
+              <a:t>T</a:t>
+            </a:r>
+            <a:r>
+              <a:rPr lang="en-US" baseline="-25000" dirty="0"/>
+              <a:t>5</a:t>
+            </a:r>
+          </a:p>
+        </p:txBody>
+      </p:sp>
+      <p:sp>
+        <p:nvSpPr>
+          <p:cNvPr id="37" name="Textfeld 36">
+            <a:extLst>
+              <a:ext uri="{FF2B5EF4-FFF2-40B4-BE49-F238E27FC236}">
+                <a16:creationId xmlns:a16="http://schemas.microsoft.com/office/drawing/2014/main" id="{3BB8F2E7-22C6-CB78-BEAF-8259DA18B025}"/>
+              </a:ext>
+            </a:extLst>
+          </p:cNvPr>
+          <p:cNvSpPr txBox="1"/>
+          <p:nvPr/>
+        </p:nvSpPr>
+        <p:spPr>
+          <a:xfrm>
+            <a:off x="2517350" y="3231292"/>
+            <a:ext cx="425838" cy="369332"/>
+          </a:xfrm>
+          <a:prstGeom prst="rect">
+            <a:avLst/>
+          </a:prstGeom>
+          <a:noFill/>
+          <a:ln w="19050">
+            <a:solidFill>
+              <a:schemeClr val="accent1"/>
+            </a:solidFill>
+          </a:ln>
+        </p:spPr>
+        <p:txBody>
+          <a:bodyPr wrap="square" rtlCol="0">
+            <a:spAutoFit/>
+          </a:bodyPr>
+          <a:lstStyle/>
+          <a:p>
+            <a:r>
+              <a:rPr lang="en-US" dirty="0"/>
+              <a:t>T</a:t>
+            </a:r>
+            <a:r>
+              <a:rPr lang="en-US" baseline="-25000" dirty="0"/>
+              <a:t>6</a:t>
+            </a:r>
+          </a:p>
+        </p:txBody>
+      </p:sp>
+      <p:cxnSp>
+        <p:nvCxnSpPr>
+          <p:cNvPr id="38" name="Gerade Verbindung 37">
+            <a:extLst>
+              <a:ext uri="{FF2B5EF4-FFF2-40B4-BE49-F238E27FC236}">
+                <a16:creationId xmlns:a16="http://schemas.microsoft.com/office/drawing/2014/main" id="{118A33AF-3298-DBDF-1392-E1C0F0DCDE27}"/>
+              </a:ext>
+            </a:extLst>
+          </p:cNvPr>
+          <p:cNvCxnSpPr>
+            <a:cxnSpLocks/>
+          </p:cNvCxnSpPr>
+          <p:nvPr/>
+        </p:nvCxnSpPr>
+        <p:spPr>
+          <a:xfrm flipH="1">
+            <a:off x="1599574" y="3072544"/>
+            <a:ext cx="17208" cy="1291137"/>
+          </a:xfrm>
+          <a:prstGeom prst="line">
+            <a:avLst/>
+          </a:prstGeom>
+          <a:ln>
+            <a:solidFill>
+              <a:schemeClr val="bg1">
+                <a:lumMod val="75000"/>
+              </a:schemeClr>
+            </a:solidFill>
+            <a:prstDash val="sysDash"/>
+          </a:ln>
+        </p:spPr>
+        <p:style>
+          <a:lnRef idx="2">
+            <a:schemeClr val="accent1"/>
+          </a:lnRef>
+          <a:fillRef idx="0">
+            <a:schemeClr val="accent1"/>
+          </a:fillRef>
+          <a:effectRef idx="1">
+            <a:schemeClr val="accent1"/>
+          </a:effectRef>
+          <a:fontRef idx="minor">
+            <a:schemeClr val="tx1"/>
+          </a:fontRef>
+        </p:style>
+      </p:cxnSp>
+      <p:cxnSp>
+        <p:nvCxnSpPr>
+          <p:cNvPr id="39" name="Gerade Verbindung 38">
+            <a:extLst>
+              <a:ext uri="{FF2B5EF4-FFF2-40B4-BE49-F238E27FC236}">
+                <a16:creationId xmlns:a16="http://schemas.microsoft.com/office/drawing/2014/main" id="{6C6F0CDC-2FC9-CCFA-C298-128E14B4B8AA}"/>
+              </a:ext>
+            </a:extLst>
+          </p:cNvPr>
+          <p:cNvCxnSpPr>
+            <a:cxnSpLocks/>
+          </p:cNvCxnSpPr>
+          <p:nvPr/>
+        </p:nvCxnSpPr>
+        <p:spPr>
+          <a:xfrm>
+            <a:off x="4292494" y="3052038"/>
+            <a:ext cx="0" cy="2986126"/>
+          </a:xfrm>
+          <a:prstGeom prst="line">
+            <a:avLst/>
+          </a:prstGeom>
+          <a:ln>
+            <a:solidFill>
+              <a:schemeClr val="bg1">
+                <a:lumMod val="75000"/>
+              </a:schemeClr>
+            </a:solidFill>
+            <a:prstDash val="sysDash"/>
+          </a:ln>
+        </p:spPr>
+        <p:style>
+          <a:lnRef idx="2">
+            <a:schemeClr val="accent1"/>
+          </a:lnRef>
+          <a:fillRef idx="0">
+            <a:schemeClr val="accent1"/>
+          </a:fillRef>
+          <a:effectRef idx="1">
+            <a:schemeClr val="accent1"/>
+          </a:effectRef>
+          <a:fontRef idx="minor">
+            <a:schemeClr val="tx1"/>
+          </a:fontRef>
+        </p:style>
+      </p:cxnSp>
+      <p:sp>
+        <p:nvSpPr>
+          <p:cNvPr id="40" name="Textfeld 39">
+            <a:extLst>
+              <a:ext uri="{FF2B5EF4-FFF2-40B4-BE49-F238E27FC236}">
+                <a16:creationId xmlns:a16="http://schemas.microsoft.com/office/drawing/2014/main" id="{18CF1411-27AF-0DDB-F232-5E2BAC4E4DF6}"/>
+              </a:ext>
+            </a:extLst>
+          </p:cNvPr>
+          <p:cNvSpPr txBox="1"/>
+          <p:nvPr/>
+        </p:nvSpPr>
+        <p:spPr>
+          <a:xfrm>
+            <a:off x="1413522" y="2713484"/>
+            <a:ext cx="405880" cy="338554"/>
+          </a:xfrm>
+          <a:prstGeom prst="rect">
+            <a:avLst/>
+          </a:prstGeom>
+          <a:noFill/>
+        </p:spPr>
+        <p:txBody>
+          <a:bodyPr wrap="none" rtlCol="0">
+            <a:spAutoFit/>
+          </a:bodyPr>
+          <a:lstStyle/>
+          <a:p>
+            <a:r>
+              <a:rPr lang="en-US" sz="1600" dirty="0">
+                <a:solidFill>
+                  <a:schemeClr val="bg1">
+                    <a:lumMod val="50000"/>
+                  </a:schemeClr>
+                </a:solidFill>
+              </a:rPr>
+              <a:t>w</a:t>
+            </a:r>
+            <a:r>
+              <a:rPr lang="en-US" sz="1600" baseline="-25000" dirty="0">
+                <a:solidFill>
+                  <a:schemeClr val="bg1">
+                    <a:lumMod val="50000"/>
+                  </a:schemeClr>
+                </a:solidFill>
+              </a:rPr>
+              <a:t>0</a:t>
+            </a:r>
+          </a:p>
+        </p:txBody>
+      </p:sp>
+      <p:sp>
+        <p:nvSpPr>
+          <p:cNvPr id="41" name="Oval 40">
+            <a:extLst>
+              <a:ext uri="{FF2B5EF4-FFF2-40B4-BE49-F238E27FC236}">
+                <a16:creationId xmlns:a16="http://schemas.microsoft.com/office/drawing/2014/main" id="{CDCCA327-7440-BA0A-B278-FA7BEB32876F}"/>
               </a:ext>
             </a:extLst>
           </p:cNvPr>
@@ -3992,8 +5425,8 @@
         </p:nvSpPr>
         <p:spPr>
           <a:xfrm>
-            <a:off x="9122565" y="2345655"/>
-            <a:ext cx="555171" cy="555171"/>
+            <a:off x="3084723" y="3384840"/>
+            <a:ext cx="108857" cy="91744"/>
           </a:xfrm>
           <a:prstGeom prst="ellipse">
             <a:avLst/>
@@ -4020,63 +5453,262 @@
           <a:lstStyle/>
           <a:p>
             <a:pPr algn="ctr"/>
-            <a:r>
-              <a:rPr lang="en-US" sz="1500" dirty="0"/>
-              <a:t>k</a:t>
-            </a:r>
-            <a:endParaRPr lang="en-US" sz="1500" baseline="-25000" dirty="0"/>
-          </a:p>
-        </p:txBody>
-      </p:sp>
-      <p:cxnSp>
-        <p:nvCxnSpPr>
-          <p:cNvPr id="17" name="Gerade Verbindung mit Pfeil 16">
-            <a:extLst>
-              <a:ext uri="{FF2B5EF4-FFF2-40B4-BE49-F238E27FC236}">
-                <a16:creationId xmlns:a16="http://schemas.microsoft.com/office/drawing/2014/main" id="{A982EBF3-5030-CA6B-823F-98DAFFB40228}"/>
-              </a:ext>
-            </a:extLst>
-          </p:cNvPr>
-          <p:cNvCxnSpPr>
-            <a:cxnSpLocks/>
-            <a:stCxn id="2" idx="5"/>
-            <a:endCxn id="16" idx="0"/>
-          </p:cNvCxnSpPr>
+            <a:endParaRPr lang="en-US"/>
+          </a:p>
+        </p:txBody>
+      </p:sp>
+      <p:sp>
+        <p:nvSpPr>
+          <p:cNvPr id="42" name="Oval 41">
+            <a:extLst>
+              <a:ext uri="{FF2B5EF4-FFF2-40B4-BE49-F238E27FC236}">
+                <a16:creationId xmlns:a16="http://schemas.microsoft.com/office/drawing/2014/main" id="{AA828937-7700-4F24-BB37-5C98C49EEA69}"/>
+              </a:ext>
+            </a:extLst>
+          </p:cNvPr>
+          <p:cNvSpPr/>
           <p:nvPr/>
-        </p:nvCxnSpPr>
-        <p:spPr>
-          <a:xfrm>
-            <a:off x="8481507" y="1599356"/>
-            <a:ext cx="918644" cy="746299"/>
-          </a:xfrm>
-          <a:prstGeom prst="straightConnector1">
+        </p:nvSpPr>
+        <p:spPr>
+          <a:xfrm>
+            <a:off x="3291553" y="3384841"/>
+            <a:ext cx="108857" cy="91744"/>
+          </a:xfrm>
+          <a:prstGeom prst="ellipse">
             <a:avLst/>
           </a:prstGeom>
-          <a:ln w="25400">
-            <a:tailEnd type="arrow" w="med" len="lg"/>
-          </a:ln>
         </p:spPr>
         <p:style>
           <a:lnRef idx="2">
-            <a:schemeClr val="accent1"/>
+            <a:schemeClr val="accent1">
+              <a:shade val="15000"/>
+            </a:schemeClr>
           </a:lnRef>
-          <a:fillRef idx="0">
+          <a:fillRef idx="1">
             <a:schemeClr val="accent1"/>
           </a:fillRef>
-          <a:effectRef idx="1">
+          <a:effectRef idx="0">
             <a:schemeClr val="accent1"/>
           </a:effectRef>
           <a:fontRef idx="minor">
-            <a:schemeClr val="tx1"/>
+            <a:schemeClr val="lt1"/>
           </a:fontRef>
         </p:style>
-      </p:cxnSp>
-      <p:sp>
-        <p:nvSpPr>
-          <p:cNvPr id="18" name="Textfeld 17">
-            <a:extLst>
-              <a:ext uri="{FF2B5EF4-FFF2-40B4-BE49-F238E27FC236}">
-                <a16:creationId xmlns:a16="http://schemas.microsoft.com/office/drawing/2014/main" id="{A95D469C-1969-64DD-07C2-DE5AC44924C3}"/>
+        <p:txBody>
+          <a:bodyPr rtlCol="0" anchor="ctr"/>
+          <a:lstStyle/>
+          <a:p>
+            <a:pPr algn="ctr"/>
+            <a:endParaRPr lang="en-US"/>
+          </a:p>
+        </p:txBody>
+      </p:sp>
+      <p:sp>
+        <p:nvSpPr>
+          <p:cNvPr id="43" name="Oval 42">
+            <a:extLst>
+              <a:ext uri="{FF2B5EF4-FFF2-40B4-BE49-F238E27FC236}">
+                <a16:creationId xmlns:a16="http://schemas.microsoft.com/office/drawing/2014/main" id="{29D4C1B1-2135-038E-F4AC-74923EA8EABB}"/>
+              </a:ext>
+            </a:extLst>
+          </p:cNvPr>
+          <p:cNvSpPr/>
+          <p:nvPr/>
+        </p:nvSpPr>
+        <p:spPr>
+          <a:xfrm>
+            <a:off x="3498383" y="3384841"/>
+            <a:ext cx="108857" cy="91744"/>
+          </a:xfrm>
+          <a:prstGeom prst="ellipse">
+            <a:avLst/>
+          </a:prstGeom>
+        </p:spPr>
+        <p:style>
+          <a:lnRef idx="2">
+            <a:schemeClr val="accent1">
+              <a:shade val="15000"/>
+            </a:schemeClr>
+          </a:lnRef>
+          <a:fillRef idx="1">
+            <a:schemeClr val="accent1"/>
+          </a:fillRef>
+          <a:effectRef idx="0">
+            <a:schemeClr val="accent1"/>
+          </a:effectRef>
+          <a:fontRef idx="minor">
+            <a:schemeClr val="lt1"/>
+          </a:fontRef>
+        </p:style>
+        <p:txBody>
+          <a:bodyPr rtlCol="0" anchor="ctr"/>
+          <a:lstStyle/>
+          <a:p>
+            <a:pPr algn="ctr"/>
+            <a:endParaRPr lang="en-US"/>
+          </a:p>
+        </p:txBody>
+      </p:sp>
+      <mc:AlternateContent xmlns:mc="http://schemas.openxmlformats.org/markup-compatibility/2006">
+        <mc:Choice xmlns:a14="http://schemas.microsoft.com/office/drawing/2010/main" Requires="a14">
+          <p:sp>
+            <p:nvSpPr>
+              <p:cNvPr id="44" name="Textfeld 43">
+                <a:extLst>
+                  <a:ext uri="{FF2B5EF4-FFF2-40B4-BE49-F238E27FC236}">
+                    <a16:creationId xmlns:a16="http://schemas.microsoft.com/office/drawing/2014/main" id="{78551978-4D13-2769-B7DC-B19B7524D837}"/>
+                  </a:ext>
+                </a:extLst>
+              </p:cNvPr>
+              <p:cNvSpPr txBox="1"/>
+              <p:nvPr/>
+            </p:nvSpPr>
+            <p:spPr>
+              <a:xfrm>
+                <a:off x="3878311" y="2553010"/>
+                <a:ext cx="828368" cy="523220"/>
+              </a:xfrm>
+              <a:prstGeom prst="rect">
+                <a:avLst/>
+              </a:prstGeom>
+              <a:noFill/>
+            </p:spPr>
+            <p:txBody>
+              <a:bodyPr wrap="none" rtlCol="0">
+                <a:spAutoFit/>
+              </a:bodyPr>
+              <a:lstStyle/>
+              <a:p>
+                <a:pPr algn="ctr"/>
+                <a:r>
+                  <a:rPr lang="en-US" sz="1400" dirty="0">
+                    <a:solidFill>
+                      <a:schemeClr val="bg1">
+                        <a:lumMod val="50000"/>
+                      </a:schemeClr>
+                    </a:solidFill>
+                  </a:rPr>
+                  <a:t>W</a:t>
+                </a:r>
+                <a:r>
+                  <a:rPr lang="en-US" sz="1400" baseline="-25000" dirty="0">
+                    <a:solidFill>
+                      <a:schemeClr val="bg1">
+                        <a:lumMod val="50000"/>
+                      </a:schemeClr>
+                    </a:solidFill>
+                  </a:rPr>
+                  <a:t>0</a:t>
+                </a:r>
+                <a:r>
+                  <a:rPr lang="en-US" sz="1400" dirty="0">
+                    <a:solidFill>
+                      <a:schemeClr val="bg1">
+                        <a:lumMod val="50000"/>
+                      </a:schemeClr>
+                    </a:solidFill>
+                  </a:rPr>
+                  <a:t>+</a:t>
+                </a:r>
+                <a:br>
+                  <a:rPr lang="en-US" sz="1400" dirty="0">
+                    <a:solidFill>
+                      <a:schemeClr val="bg1">
+                        <a:lumMod val="50000"/>
+                      </a:schemeClr>
+                    </a:solidFill>
+                  </a:rPr>
+                </a:br>
+                <a:r>
+                  <a:rPr lang="en-US" sz="1400" dirty="0">
+                    <a:solidFill>
+                      <a:schemeClr val="bg1">
+                        <a:lumMod val="50000"/>
+                      </a:schemeClr>
+                    </a:solidFill>
+                  </a:rPr>
+                  <a:t>n/2(1+</a:t>
+                </a:r>
+                <a14:m>
+                  <m:oMath xmlns:m="http://schemas.openxmlformats.org/officeDocument/2006/math">
+                    <m:r>
+                      <a:rPr lang="en-US" sz="1400" b="0" i="1" smtClean="0">
+                        <a:solidFill>
+                          <a:schemeClr val="bg1">
+                            <a:lumMod val="50000"/>
+                          </a:schemeClr>
+                        </a:solidFill>
+                        <a:latin typeface="Cambria Math" panose="02040503050406030204" pitchFamily="18" charset="0"/>
+                      </a:rPr>
+                      <m:t>𝜖</m:t>
+                    </m:r>
+                  </m:oMath>
+                </a14:m>
+                <a:r>
+                  <a:rPr lang="en-US" sz="1400" dirty="0">
+                    <a:solidFill>
+                      <a:schemeClr val="bg1">
+                        <a:lumMod val="50000"/>
+                      </a:schemeClr>
+                    </a:solidFill>
+                  </a:rPr>
+                  <a:t>)</a:t>
+                </a:r>
+              </a:p>
+            </p:txBody>
+          </p:sp>
+        </mc:Choice>
+        <mc:Fallback>
+          <p:sp>
+            <p:nvSpPr>
+              <p:cNvPr id="44" name="Textfeld 43">
+                <a:extLst>
+                  <a:ext uri="{FF2B5EF4-FFF2-40B4-BE49-F238E27FC236}">
+                    <a16:creationId xmlns:a16="http://schemas.microsoft.com/office/drawing/2014/main" id="{78551978-4D13-2769-B7DC-B19B7524D837}"/>
+                  </a:ext>
+                </a:extLst>
+              </p:cNvPr>
+              <p:cNvSpPr txBox="1">
+                <a:spLocks noRot="1" noChangeAspect="1" noMove="1" noResize="1" noEditPoints="1" noAdjustHandles="1" noChangeArrowheads="1" noChangeShapeType="1" noTextEdit="1"/>
+              </p:cNvSpPr>
+              <p:nvPr/>
+            </p:nvSpPr>
+            <p:spPr>
+              <a:xfrm>
+                <a:off x="3878311" y="2553010"/>
+                <a:ext cx="828368" cy="523220"/>
+              </a:xfrm>
+              <a:prstGeom prst="rect">
+                <a:avLst/>
+              </a:prstGeom>
+              <a:blipFill>
+                <a:blip r:embed="rId8"/>
+                <a:stretch>
+                  <a:fillRect l="-1515" t="-2381" r="-1515" b="-11905"/>
+                </a:stretch>
+              </a:blipFill>
+            </p:spPr>
+            <p:txBody>
+              <a:bodyPr/>
+              <a:lstStyle/>
+              <a:p>
+                <a:r>
+                  <a:rPr lang="en-US">
+                    <a:noFill/>
+                  </a:rPr>
+                  <a:t> </a:t>
+                </a:r>
+              </a:p>
+            </p:txBody>
+          </p:sp>
+        </mc:Fallback>
+      </mc:AlternateContent>
+      <p:sp>
+        <p:nvSpPr>
+          <p:cNvPr id="45" name="Textfeld 44">
+            <a:extLst>
+              <a:ext uri="{FF2B5EF4-FFF2-40B4-BE49-F238E27FC236}">
+                <a16:creationId xmlns:a16="http://schemas.microsoft.com/office/drawing/2014/main" id="{24D79217-B70F-7D5D-1B41-19226E2E773C}"/>
               </a:ext>
             </a:extLst>
           </p:cNvPr>
@@ -4085,36 +5717,87 @@
         </p:nvSpPr>
         <p:spPr>
           <a:xfrm>
-            <a:off x="10624595" y="1885549"/>
-            <a:ext cx="402674" cy="338554"/>
+            <a:off x="3872746" y="3220681"/>
+            <a:ext cx="396014" cy="369332"/>
+          </a:xfrm>
+          <a:prstGeom prst="rect">
+            <a:avLst/>
+          </a:prstGeom>
+          <a:noFill/>
+          <a:ln w="19050">
+            <a:solidFill>
+              <a:schemeClr val="accent1"/>
+            </a:solidFill>
+          </a:ln>
+        </p:spPr>
+        <p:txBody>
+          <a:bodyPr wrap="square" rtlCol="0">
+            <a:spAutoFit/>
+          </a:bodyPr>
+          <a:lstStyle/>
+          <a:p>
+            <a:r>
+              <a:rPr lang="en-US" dirty="0"/>
+              <a:t>T</a:t>
+            </a:r>
+            <a:r>
+              <a:rPr lang="en-US" baseline="-25000" dirty="0"/>
+              <a:t>n</a:t>
+            </a:r>
+          </a:p>
+        </p:txBody>
+      </p:sp>
+      <p:sp>
+        <p:nvSpPr>
+          <p:cNvPr id="46" name="Textfeld 45">
+            <a:extLst>
+              <a:ext uri="{FF2B5EF4-FFF2-40B4-BE49-F238E27FC236}">
+                <a16:creationId xmlns:a16="http://schemas.microsoft.com/office/drawing/2014/main" id="{038A0677-B524-64B5-30E7-F735272EEE3B}"/>
+              </a:ext>
+            </a:extLst>
+          </p:cNvPr>
+          <p:cNvSpPr txBox="1"/>
+          <p:nvPr/>
+        </p:nvSpPr>
+        <p:spPr>
+          <a:xfrm>
+            <a:off x="1612942" y="3994349"/>
+            <a:ext cx="484087" cy="369332"/>
           </a:xfrm>
           <a:prstGeom prst="rect">
             <a:avLst/>
           </a:prstGeom>
           <a:noFill/>
           <a:ln>
-            <a:noFill/>
+            <a:solidFill>
+              <a:schemeClr val="accent1"/>
+            </a:solidFill>
+            <a:prstDash val="dash"/>
           </a:ln>
         </p:spPr>
         <p:txBody>
-          <a:bodyPr wrap="none" rtlCol="0">
+          <a:bodyPr wrap="square" rtlCol="0">
             <a:spAutoFit/>
           </a:bodyPr>
           <a:lstStyle/>
           <a:p>
             <a:r>
-              <a:rPr lang="en-US" sz="2400" baseline="-25000" dirty="0"/>
-              <a:t>10</a:t>
-            </a:r>
-          </a:p>
-        </p:txBody>
-      </p:sp>
-      <p:sp>
-        <p:nvSpPr>
-          <p:cNvPr id="19" name="Textfeld 18">
-            <a:extLst>
-              <a:ext uri="{FF2B5EF4-FFF2-40B4-BE49-F238E27FC236}">
-                <a16:creationId xmlns:a16="http://schemas.microsoft.com/office/drawing/2014/main" id="{3F34CA9B-2EC5-04AF-DF37-488ED5738786}"/>
+              <a:rPr lang="en-US" dirty="0"/>
+              <a:t>c</a:t>
+            </a:r>
+            <a:r>
+              <a:rPr lang="en-US" baseline="-25000" dirty="0"/>
+              <a:t>01</a:t>
+            </a:r>
+          </a:p>
+        </p:txBody>
+      </p:sp>
+      <p:sp>
+        <p:nvSpPr>
+          <p:cNvPr id="47" name="Textfeld 46">
+            <a:extLst>
+              <a:ext uri="{FF2B5EF4-FFF2-40B4-BE49-F238E27FC236}">
+                <a16:creationId xmlns:a16="http://schemas.microsoft.com/office/drawing/2014/main" id="{A02860AC-BAD1-EEBB-0A52-554007E9001E}"/>
               </a:ext>
             </a:extLst>
           </p:cNvPr>
@@ -4123,270 +5806,43 @@
         </p:nvSpPr>
         <p:spPr>
           <a:xfrm>
-            <a:off x="6856338" y="3065861"/>
-            <a:ext cx="441146" cy="461665"/>
-          </a:xfrm>
-          <a:prstGeom prst="rect">
-            <a:avLst/>
-          </a:prstGeom>
-          <a:noFill/>
-        </p:spPr>
-        <p:txBody>
-          <a:bodyPr wrap="none" rtlCol="0">
-            <a:spAutoFit/>
-          </a:bodyPr>
-          <a:lstStyle/>
-          <a:p>
-            <a:r>
-              <a:rPr lang="en-US" sz="2400" dirty="0"/>
-              <a:t>T</a:t>
-            </a:r>
-            <a:r>
-              <a:rPr lang="en-US" sz="2400" baseline="-25000" dirty="0"/>
-              <a:t>1</a:t>
-            </a:r>
-          </a:p>
-        </p:txBody>
-      </p:sp>
-      <p:sp>
-        <p:nvSpPr>
-          <p:cNvPr id="20" name="Textfeld 19">
-            <a:extLst>
-              <a:ext uri="{FF2B5EF4-FFF2-40B4-BE49-F238E27FC236}">
-                <a16:creationId xmlns:a16="http://schemas.microsoft.com/office/drawing/2014/main" id="{34CD2C78-69F1-83BA-7E42-97257499BF9A}"/>
-              </a:ext>
-            </a:extLst>
-          </p:cNvPr>
-          <p:cNvSpPr txBox="1"/>
-          <p:nvPr/>
-        </p:nvSpPr>
-        <p:spPr>
-          <a:xfrm>
-            <a:off x="7640107" y="3049510"/>
-            <a:ext cx="441146" cy="461665"/>
-          </a:xfrm>
-          <a:prstGeom prst="rect">
-            <a:avLst/>
-          </a:prstGeom>
-          <a:noFill/>
-        </p:spPr>
-        <p:txBody>
-          <a:bodyPr wrap="none" rtlCol="0">
-            <a:spAutoFit/>
-          </a:bodyPr>
-          <a:lstStyle/>
-          <a:p>
-            <a:r>
-              <a:rPr lang="en-US" sz="2400" dirty="0"/>
-              <a:t>T</a:t>
-            </a:r>
-            <a:r>
-              <a:rPr lang="en-US" sz="2400" baseline="-25000" dirty="0"/>
-              <a:t>2</a:t>
-            </a:r>
-          </a:p>
-        </p:txBody>
-      </p:sp>
-      <p:sp>
-        <p:nvSpPr>
-          <p:cNvPr id="21" name="Textfeld 20">
-            <a:extLst>
-              <a:ext uri="{FF2B5EF4-FFF2-40B4-BE49-F238E27FC236}">
-                <a16:creationId xmlns:a16="http://schemas.microsoft.com/office/drawing/2014/main" id="{E589B002-63D6-A225-00E5-9BBA02D025A6}"/>
-              </a:ext>
-            </a:extLst>
-          </p:cNvPr>
-          <p:cNvSpPr txBox="1"/>
-          <p:nvPr/>
-        </p:nvSpPr>
-        <p:spPr>
-          <a:xfrm>
-            <a:off x="8423876" y="3033159"/>
-            <a:ext cx="441146" cy="461665"/>
-          </a:xfrm>
-          <a:prstGeom prst="rect">
-            <a:avLst/>
-          </a:prstGeom>
-          <a:noFill/>
-        </p:spPr>
-        <p:txBody>
-          <a:bodyPr wrap="none" rtlCol="0">
-            <a:spAutoFit/>
-          </a:bodyPr>
-          <a:lstStyle/>
-          <a:p>
-            <a:r>
-              <a:rPr lang="en-US" sz="2400" dirty="0"/>
-              <a:t>T</a:t>
-            </a:r>
-            <a:r>
-              <a:rPr lang="en-US" sz="2400" baseline="-25000" dirty="0"/>
-              <a:t>3</a:t>
-            </a:r>
-          </a:p>
-        </p:txBody>
-      </p:sp>
-      <p:sp>
-        <p:nvSpPr>
-          <p:cNvPr id="22" name="Textfeld 21">
-            <a:extLst>
-              <a:ext uri="{FF2B5EF4-FFF2-40B4-BE49-F238E27FC236}">
-                <a16:creationId xmlns:a16="http://schemas.microsoft.com/office/drawing/2014/main" id="{AB77B721-F406-FC41-DF59-060DCF2A09CE}"/>
-              </a:ext>
-            </a:extLst>
-          </p:cNvPr>
-          <p:cNvSpPr txBox="1"/>
-          <p:nvPr/>
-        </p:nvSpPr>
-        <p:spPr>
-          <a:xfrm>
-            <a:off x="9207645" y="3016808"/>
-            <a:ext cx="441146" cy="461665"/>
-          </a:xfrm>
-          <a:prstGeom prst="rect">
-            <a:avLst/>
-          </a:prstGeom>
-          <a:noFill/>
-        </p:spPr>
-        <p:txBody>
-          <a:bodyPr wrap="none" rtlCol="0">
-            <a:spAutoFit/>
-          </a:bodyPr>
-          <a:lstStyle/>
-          <a:p>
-            <a:r>
-              <a:rPr lang="en-US" sz="2400" dirty="0"/>
-              <a:t>T</a:t>
-            </a:r>
-            <a:r>
-              <a:rPr lang="en-US" sz="2400" baseline="-25000" dirty="0"/>
-              <a:t>4</a:t>
-            </a:r>
-          </a:p>
-        </p:txBody>
-      </p:sp>
-      <p:sp>
-        <p:nvSpPr>
-          <p:cNvPr id="23" name="Textfeld 22">
-            <a:extLst>
-              <a:ext uri="{FF2B5EF4-FFF2-40B4-BE49-F238E27FC236}">
-                <a16:creationId xmlns:a16="http://schemas.microsoft.com/office/drawing/2014/main" id="{FC3C6312-53E2-796D-A991-8F3D7193F952}"/>
-              </a:ext>
-            </a:extLst>
-          </p:cNvPr>
-          <p:cNvSpPr txBox="1"/>
-          <p:nvPr/>
-        </p:nvSpPr>
-        <p:spPr>
-          <a:xfrm>
-            <a:off x="10580220" y="2992110"/>
-            <a:ext cx="432106" cy="461665"/>
-          </a:xfrm>
-          <a:prstGeom prst="rect">
-            <a:avLst/>
-          </a:prstGeom>
-          <a:noFill/>
-        </p:spPr>
-        <p:txBody>
-          <a:bodyPr wrap="none" rtlCol="0">
-            <a:spAutoFit/>
-          </a:bodyPr>
-          <a:lstStyle/>
-          <a:p>
-            <a:r>
-              <a:rPr lang="en-US" sz="2400" dirty="0"/>
-              <a:t>T</a:t>
-            </a:r>
-            <a:r>
-              <a:rPr lang="en-US" sz="2400" baseline="-25000" dirty="0"/>
-              <a:t>n</a:t>
-            </a:r>
-          </a:p>
-        </p:txBody>
-      </p:sp>
-      <p:sp>
-        <p:nvSpPr>
-          <p:cNvPr id="24" name="Textfeld 23">
-            <a:extLst>
-              <a:ext uri="{FF2B5EF4-FFF2-40B4-BE49-F238E27FC236}">
-                <a16:creationId xmlns:a16="http://schemas.microsoft.com/office/drawing/2014/main" id="{7246FA8B-E128-09C0-373F-AF99DBCF3F9A}"/>
-              </a:ext>
-            </a:extLst>
-          </p:cNvPr>
-          <p:cNvSpPr txBox="1"/>
-          <p:nvPr/>
-        </p:nvSpPr>
-        <p:spPr>
-          <a:xfrm>
-            <a:off x="8064651" y="637105"/>
-            <a:ext cx="441146" cy="461665"/>
-          </a:xfrm>
-          <a:prstGeom prst="rect">
-            <a:avLst/>
-          </a:prstGeom>
-          <a:noFill/>
-        </p:spPr>
-        <p:txBody>
-          <a:bodyPr wrap="none" rtlCol="0">
-            <a:spAutoFit/>
-          </a:bodyPr>
-          <a:lstStyle/>
-          <a:p>
-            <a:r>
-              <a:rPr lang="en-US" sz="2400" dirty="0"/>
-              <a:t>T</a:t>
-            </a:r>
-            <a:r>
-              <a:rPr lang="en-US" sz="2400" baseline="-25000" dirty="0"/>
-              <a:t>0</a:t>
-            </a:r>
-          </a:p>
-        </p:txBody>
-      </p:sp>
-      <p:sp>
-        <p:nvSpPr>
-          <p:cNvPr id="25" name="Textfeld 24">
-            <a:extLst>
-              <a:ext uri="{FF2B5EF4-FFF2-40B4-BE49-F238E27FC236}">
-                <a16:creationId xmlns:a16="http://schemas.microsoft.com/office/drawing/2014/main" id="{BD6FA755-7A2B-ABD9-405D-81825D1A4FE0}"/>
-              </a:ext>
-            </a:extLst>
-          </p:cNvPr>
-          <p:cNvSpPr txBox="1"/>
-          <p:nvPr/>
-        </p:nvSpPr>
-        <p:spPr>
-          <a:xfrm>
-            <a:off x="7065385" y="1825341"/>
-            <a:ext cx="284052" cy="338554"/>
+            <a:off x="2098125" y="4750622"/>
+            <a:ext cx="471651" cy="369332"/>
           </a:xfrm>
           <a:prstGeom prst="rect">
             <a:avLst/>
           </a:prstGeom>
           <a:noFill/>
           <a:ln>
-            <a:noFill/>
+            <a:solidFill>
+              <a:schemeClr val="accent1"/>
+            </a:solidFill>
+            <a:prstDash val="dash"/>
           </a:ln>
         </p:spPr>
         <p:txBody>
-          <a:bodyPr wrap="none" rtlCol="0">
+          <a:bodyPr wrap="square" rtlCol="0">
             <a:spAutoFit/>
           </a:bodyPr>
           <a:lstStyle/>
           <a:p>
             <a:r>
-              <a:rPr lang="en-US" sz="2400" baseline="-25000" dirty="0"/>
-              <a:t>k</a:t>
-            </a:r>
-          </a:p>
-        </p:txBody>
-      </p:sp>
-      <p:sp>
-        <p:nvSpPr>
-          <p:cNvPr id="26" name="Textfeld 25">
-            <a:extLst>
-              <a:ext uri="{FF2B5EF4-FFF2-40B4-BE49-F238E27FC236}">
-                <a16:creationId xmlns:a16="http://schemas.microsoft.com/office/drawing/2014/main" id="{2B8D0237-75DB-EBB8-F8DC-37933E597269}"/>
+              <a:rPr lang="en-US" dirty="0"/>
+              <a:t>c</a:t>
+            </a:r>
+            <a:r>
+              <a:rPr lang="en-US" baseline="-25000" dirty="0"/>
+              <a:t>03</a:t>
+            </a:r>
+          </a:p>
+        </p:txBody>
+      </p:sp>
+      <p:sp>
+        <p:nvSpPr>
+          <p:cNvPr id="48" name="Textfeld 47">
+            <a:extLst>
+              <a:ext uri="{FF2B5EF4-FFF2-40B4-BE49-F238E27FC236}">
+                <a16:creationId xmlns:a16="http://schemas.microsoft.com/office/drawing/2014/main" id="{90B2C6D3-02DD-2584-79A7-FD0FBB5A3366}"/>
               </a:ext>
             </a:extLst>
           </p:cNvPr>
@@ -4395,27 +5851,414 @@
         </p:nvSpPr>
         <p:spPr>
           <a:xfrm>
-            <a:off x="8545092" y="1827042"/>
-            <a:ext cx="284052" cy="338554"/>
+            <a:off x="2580098" y="5402588"/>
+            <a:ext cx="471651" cy="369332"/>
           </a:xfrm>
           <a:prstGeom prst="rect">
             <a:avLst/>
           </a:prstGeom>
           <a:noFill/>
           <a:ln>
-            <a:noFill/>
+            <a:solidFill>
+              <a:schemeClr val="accent1"/>
+            </a:solidFill>
+            <a:prstDash val="dash"/>
           </a:ln>
         </p:spPr>
         <p:txBody>
-          <a:bodyPr wrap="none" rtlCol="0">
+          <a:bodyPr wrap="square" rtlCol="0">
             <a:spAutoFit/>
           </a:bodyPr>
           <a:lstStyle/>
           <a:p>
             <a:r>
-              <a:rPr lang="en-US" sz="2400" baseline="-25000" dirty="0"/>
-              <a:t>k</a:t>
-            </a:r>
+              <a:rPr lang="en-US" dirty="0"/>
+              <a:t>c</a:t>
+            </a:r>
+            <a:r>
+              <a:rPr lang="en-US" baseline="-25000" dirty="0"/>
+              <a:t>05</a:t>
+            </a:r>
+          </a:p>
+        </p:txBody>
+      </p:sp>
+      <mc:AlternateContent xmlns:mc="http://schemas.openxmlformats.org/markup-compatibility/2006">
+        <mc:Choice xmlns:a14="http://schemas.microsoft.com/office/drawing/2010/main" Requires="a14">
+          <p:sp>
+            <p:nvSpPr>
+              <p:cNvPr id="49" name="Textfeld 48">
+                <a:extLst>
+                  <a:ext uri="{FF2B5EF4-FFF2-40B4-BE49-F238E27FC236}">
+                    <a16:creationId xmlns:a16="http://schemas.microsoft.com/office/drawing/2014/main" id="{693DD51E-B97C-F4A7-8384-EE4E633DDD54}"/>
+                  </a:ext>
+                </a:extLst>
+              </p:cNvPr>
+              <p:cNvSpPr txBox="1"/>
+              <p:nvPr/>
+            </p:nvSpPr>
+            <p:spPr>
+              <a:xfrm>
+                <a:off x="5001768" y="5119954"/>
+                <a:ext cx="5709383" cy="369332"/>
+              </a:xfrm>
+              <a:prstGeom prst="rect">
+                <a:avLst/>
+              </a:prstGeom>
+              <a:noFill/>
+            </p:spPr>
+            <p:txBody>
+              <a:bodyPr wrap="none" rtlCol="0">
+                <a:spAutoFit/>
+              </a:bodyPr>
+              <a:lstStyle/>
+              <a:p>
+                <a:r>
+                  <a:rPr lang="en-US" dirty="0"/>
+                  <a:t>For </a:t>
+                </a:r>
+                <a14:m>
+                  <m:oMath xmlns:m="http://schemas.openxmlformats.org/officeDocument/2006/math">
+                    <m:r>
+                      <a:rPr lang="en-US" b="0" i="1" smtClean="0">
+                        <a:latin typeface="Cambria Math" panose="02040503050406030204" pitchFamily="18" charset="0"/>
+                      </a:rPr>
+                      <m:t>𝑘</m:t>
+                    </m:r>
+                    <m:r>
+                      <a:rPr lang="en-US" b="0" i="1" smtClean="0">
+                        <a:latin typeface="Cambria Math" panose="02040503050406030204" pitchFamily="18" charset="0"/>
+                      </a:rPr>
+                      <m:t>&gt;</m:t>
+                    </m:r>
+                    <m:r>
+                      <a:rPr lang="en-US" b="0" i="1" smtClean="0">
+                        <a:latin typeface="Cambria Math" panose="02040503050406030204" pitchFamily="18" charset="0"/>
+                      </a:rPr>
+                      <m:t>𝜖</m:t>
+                    </m:r>
+                    <m:r>
+                      <a:rPr lang="en-US" b="0" i="1" smtClean="0">
+                        <a:latin typeface="Cambria Math" panose="02040503050406030204" pitchFamily="18" charset="0"/>
+                      </a:rPr>
+                      <m:t>𝑛</m:t>
+                    </m:r>
+                    <m:r>
+                      <a:rPr lang="en-US" b="0" i="1" smtClean="0">
+                        <a:latin typeface="Cambria Math" panose="02040503050406030204" pitchFamily="18" charset="0"/>
+                      </a:rPr>
+                      <m:t>/2</m:t>
+                    </m:r>
+                  </m:oMath>
+                </a14:m>
+                <a:r>
+                  <a:rPr lang="en-US" dirty="0"/>
+                  <a:t>, the cost of the optimal solution is </a:t>
+                </a:r>
+                <a14:m>
+                  <m:oMath xmlns:m="http://schemas.openxmlformats.org/officeDocument/2006/math">
+                    <m:r>
+                      <m:rPr>
+                        <m:sty m:val="p"/>
+                      </m:rPr>
+                      <a:rPr lang="en-US" b="0" i="0" smtClean="0">
+                        <a:latin typeface="Cambria Math" panose="02040503050406030204" pitchFamily="18" charset="0"/>
+                      </a:rPr>
+                      <m:t>k</m:t>
+                    </m:r>
+                    <m:r>
+                      <a:rPr lang="en-US" b="0" i="0" smtClean="0">
+                        <a:latin typeface="Cambria Math" panose="02040503050406030204" pitchFamily="18" charset="0"/>
+                      </a:rPr>
+                      <m:t>+</m:t>
+                    </m:r>
+                    <m:r>
+                      <a:rPr lang="en-US" b="0" i="1" smtClean="0">
+                        <a:latin typeface="Cambria Math" panose="02040503050406030204" pitchFamily="18" charset="0"/>
+                      </a:rPr>
+                      <m:t>𝑛</m:t>
+                    </m:r>
+                    <m:r>
+                      <a:rPr lang="en-US" b="0" i="1" smtClean="0">
+                        <a:latin typeface="Cambria Math" panose="02040503050406030204" pitchFamily="18" charset="0"/>
+                      </a:rPr>
+                      <m:t>/2</m:t>
+                    </m:r>
+                  </m:oMath>
+                </a14:m>
+                <a:endParaRPr lang="en-US" dirty="0"/>
+              </a:p>
+            </p:txBody>
+          </p:sp>
+        </mc:Choice>
+        <mc:Fallback>
+          <p:sp>
+            <p:nvSpPr>
+              <p:cNvPr id="49" name="Textfeld 48">
+                <a:extLst>
+                  <a:ext uri="{FF2B5EF4-FFF2-40B4-BE49-F238E27FC236}">
+                    <a16:creationId xmlns:a16="http://schemas.microsoft.com/office/drawing/2014/main" id="{693DD51E-B97C-F4A7-8384-EE4E633DDD54}"/>
+                  </a:ext>
+                </a:extLst>
+              </p:cNvPr>
+              <p:cNvSpPr txBox="1">
+                <a:spLocks noRot="1" noChangeAspect="1" noMove="1" noResize="1" noEditPoints="1" noAdjustHandles="1" noChangeArrowheads="1" noChangeShapeType="1" noTextEdit="1"/>
+              </p:cNvSpPr>
+              <p:nvPr/>
+            </p:nvSpPr>
+            <p:spPr>
+              <a:xfrm>
+                <a:off x="5001768" y="5119954"/>
+                <a:ext cx="5709383" cy="369332"/>
+              </a:xfrm>
+              <a:prstGeom prst="rect">
+                <a:avLst/>
+              </a:prstGeom>
+              <a:blipFill>
+                <a:blip r:embed="rId9"/>
+                <a:stretch>
+                  <a:fillRect l="-1111" t="-10000" b="-26667"/>
+                </a:stretch>
+              </a:blipFill>
+            </p:spPr>
+            <p:txBody>
+              <a:bodyPr/>
+              <a:lstStyle/>
+              <a:p>
+                <a:r>
+                  <a:rPr lang="en-US">
+                    <a:noFill/>
+                  </a:rPr>
+                  <a:t> </a:t>
+                </a:r>
+              </a:p>
+            </p:txBody>
+          </p:sp>
+        </mc:Fallback>
+      </mc:AlternateContent>
+      <p:sp>
+        <p:nvSpPr>
+          <p:cNvPr id="50" name="Textfeld 49">
+            <a:extLst>
+              <a:ext uri="{FF2B5EF4-FFF2-40B4-BE49-F238E27FC236}">
+                <a16:creationId xmlns:a16="http://schemas.microsoft.com/office/drawing/2014/main" id="{5DA2F7AD-C1C3-94EE-EA93-3463FC2D0215}"/>
+              </a:ext>
+            </a:extLst>
+          </p:cNvPr>
+          <p:cNvSpPr txBox="1"/>
+          <p:nvPr/>
+        </p:nvSpPr>
+        <p:spPr>
+          <a:xfrm>
+            <a:off x="3792111" y="6038164"/>
+            <a:ext cx="471651" cy="553998"/>
+          </a:xfrm>
+          <a:prstGeom prst="rect">
+            <a:avLst/>
+          </a:prstGeom>
+          <a:noFill/>
+          <a:ln>
+            <a:solidFill>
+              <a:schemeClr val="accent1"/>
+            </a:solidFill>
+            <a:prstDash val="dash"/>
+          </a:ln>
+        </p:spPr>
+        <p:txBody>
+          <a:bodyPr wrap="square" rtlCol="0">
+            <a:spAutoFit/>
+          </a:bodyPr>
+          <a:lstStyle/>
+          <a:p>
+            <a:r>
+              <a:rPr lang="en-US" dirty="0"/>
+              <a:t>c</a:t>
+            </a:r>
+            <a:r>
+              <a:rPr lang="en-US" baseline="-25000" dirty="0"/>
+              <a:t>0 n-1</a:t>
+            </a:r>
+          </a:p>
+        </p:txBody>
+      </p:sp>
+      <p:sp>
+        <p:nvSpPr>
+          <p:cNvPr id="51" name="Textfeld 50">
+            <a:extLst>
+              <a:ext uri="{FF2B5EF4-FFF2-40B4-BE49-F238E27FC236}">
+                <a16:creationId xmlns:a16="http://schemas.microsoft.com/office/drawing/2014/main" id="{FA8131FF-41B2-9EDF-5D84-34F453890867}"/>
+              </a:ext>
+            </a:extLst>
+          </p:cNvPr>
+          <p:cNvSpPr txBox="1"/>
+          <p:nvPr/>
+        </p:nvSpPr>
+        <p:spPr>
+          <a:xfrm>
+            <a:off x="4256291" y="6130497"/>
+            <a:ext cx="1230187" cy="369332"/>
+          </a:xfrm>
+          <a:prstGeom prst="rect">
+            <a:avLst/>
+          </a:prstGeom>
+          <a:noFill/>
+          <a:ln w="19050">
+            <a:solidFill>
+              <a:schemeClr val="accent1"/>
+            </a:solidFill>
+          </a:ln>
+        </p:spPr>
+        <p:txBody>
+          <a:bodyPr wrap="square" rtlCol="0">
+            <a:spAutoFit/>
+          </a:bodyPr>
+          <a:lstStyle/>
+          <a:p>
+            <a:r>
+              <a:rPr lang="en-US" dirty="0"/>
+              <a:t>T</a:t>
+            </a:r>
+            <a:r>
+              <a:rPr lang="en-US" baseline="-25000" dirty="0"/>
+              <a:t>n-1</a:t>
+            </a:r>
+          </a:p>
+        </p:txBody>
+      </p:sp>
+      <p:sp>
+        <p:nvSpPr>
+          <p:cNvPr id="52" name="Oval 51">
+            <a:extLst>
+              <a:ext uri="{FF2B5EF4-FFF2-40B4-BE49-F238E27FC236}">
+                <a16:creationId xmlns:a16="http://schemas.microsoft.com/office/drawing/2014/main" id="{E320B2F6-AA18-7463-B115-00BD68FFBB2E}"/>
+              </a:ext>
+            </a:extLst>
+          </p:cNvPr>
+          <p:cNvSpPr/>
+          <p:nvPr/>
+        </p:nvSpPr>
+        <p:spPr>
+          <a:xfrm rot="500847">
+            <a:off x="3409569" y="5995387"/>
+            <a:ext cx="108857" cy="91744"/>
+          </a:xfrm>
+          <a:prstGeom prst="ellipse">
+            <a:avLst/>
+          </a:prstGeom>
+        </p:spPr>
+        <p:style>
+          <a:lnRef idx="2">
+            <a:schemeClr val="accent1">
+              <a:shade val="15000"/>
+            </a:schemeClr>
+          </a:lnRef>
+          <a:fillRef idx="1">
+            <a:schemeClr val="accent1"/>
+          </a:fillRef>
+          <a:effectRef idx="0">
+            <a:schemeClr val="accent1"/>
+          </a:effectRef>
+          <a:fontRef idx="minor">
+            <a:schemeClr val="lt1"/>
+          </a:fontRef>
+        </p:style>
+        <p:txBody>
+          <a:bodyPr rtlCol="0" anchor="ctr"/>
+          <a:lstStyle/>
+          <a:p>
+            <a:pPr algn="ctr"/>
+            <a:endParaRPr lang="en-US"/>
+          </a:p>
+        </p:txBody>
+      </p:sp>
+      <p:sp>
+        <p:nvSpPr>
+          <p:cNvPr id="53" name="Oval 52">
+            <a:extLst>
+              <a:ext uri="{FF2B5EF4-FFF2-40B4-BE49-F238E27FC236}">
+                <a16:creationId xmlns:a16="http://schemas.microsoft.com/office/drawing/2014/main" id="{5DF1BBCE-61B9-5C00-8C32-27F442A76F48}"/>
+              </a:ext>
+            </a:extLst>
+          </p:cNvPr>
+          <p:cNvSpPr/>
+          <p:nvPr/>
+        </p:nvSpPr>
+        <p:spPr>
+          <a:xfrm rot="500847">
+            <a:off x="3421010" y="6194666"/>
+            <a:ext cx="108857" cy="91744"/>
+          </a:xfrm>
+          <a:prstGeom prst="ellipse">
+            <a:avLst/>
+          </a:prstGeom>
+        </p:spPr>
+        <p:style>
+          <a:lnRef idx="2">
+            <a:schemeClr val="accent1">
+              <a:shade val="15000"/>
+            </a:schemeClr>
+          </a:lnRef>
+          <a:fillRef idx="1">
+            <a:schemeClr val="accent1"/>
+          </a:fillRef>
+          <a:effectRef idx="0">
+            <a:schemeClr val="accent1"/>
+          </a:effectRef>
+          <a:fontRef idx="minor">
+            <a:schemeClr val="lt1"/>
+          </a:fontRef>
+        </p:style>
+        <p:txBody>
+          <a:bodyPr rtlCol="0" anchor="ctr"/>
+          <a:lstStyle/>
+          <a:p>
+            <a:pPr algn="ctr"/>
+            <a:endParaRPr lang="en-US"/>
+          </a:p>
+        </p:txBody>
+      </p:sp>
+      <p:sp>
+        <p:nvSpPr>
+          <p:cNvPr id="54" name="Oval 53">
+            <a:extLst>
+              <a:ext uri="{FF2B5EF4-FFF2-40B4-BE49-F238E27FC236}">
+                <a16:creationId xmlns:a16="http://schemas.microsoft.com/office/drawing/2014/main" id="{28815FA9-0E70-FF21-51F4-A9BA6DA84D01}"/>
+              </a:ext>
+            </a:extLst>
+          </p:cNvPr>
+          <p:cNvSpPr/>
+          <p:nvPr/>
+        </p:nvSpPr>
+        <p:spPr>
+          <a:xfrm rot="500847">
+            <a:off x="3421010" y="6369125"/>
+            <a:ext cx="108857" cy="91744"/>
+          </a:xfrm>
+          <a:prstGeom prst="ellipse">
+            <a:avLst/>
+          </a:prstGeom>
+        </p:spPr>
+        <p:style>
+          <a:lnRef idx="2">
+            <a:schemeClr val="accent1">
+              <a:shade val="15000"/>
+            </a:schemeClr>
+          </a:lnRef>
+          <a:fillRef idx="1">
+            <a:schemeClr val="accent1"/>
+          </a:fillRef>
+          <a:effectRef idx="0">
+            <a:schemeClr val="accent1"/>
+          </a:effectRef>
+          <a:fontRef idx="minor">
+            <a:schemeClr val="lt1"/>
+          </a:fontRef>
+        </p:style>
+        <p:txBody>
+          <a:bodyPr rtlCol="0" anchor="ctr"/>
+          <a:lstStyle/>
+          <a:p>
+            <a:pPr algn="ctr"/>
+            <a:endParaRPr lang="en-US"/>
           </a:p>
         </p:txBody>
       </p:sp>
@@ -5573,10 +7416,10 @@
       </p:sp>
       <p:sp>
         <p:nvSpPr>
-          <p:cNvPr id="87" name="Textfeld 86">
-            <a:extLst>
-              <a:ext uri="{FF2B5EF4-FFF2-40B4-BE49-F238E27FC236}">
-                <a16:creationId xmlns:a16="http://schemas.microsoft.com/office/drawing/2014/main" id="{063F77DB-D747-1845-6182-09E6FDA97D56}"/>
+          <p:cNvPr id="97" name="Textfeld 96">
+            <a:extLst>
+              <a:ext uri="{FF2B5EF4-FFF2-40B4-BE49-F238E27FC236}">
+                <a16:creationId xmlns:a16="http://schemas.microsoft.com/office/drawing/2014/main" id="{9C0258DF-4FDF-5554-DFFC-E49F30BDD2DD}"/>
               </a:ext>
             </a:extLst>
           </p:cNvPr>
@@ -5585,7 +7428,7 @@
         </p:nvSpPr>
         <p:spPr>
           <a:xfrm>
-            <a:off x="3124487" y="2570846"/>
+            <a:off x="5253751" y="2562922"/>
             <a:ext cx="505267" cy="523220"/>
           </a:xfrm>
           <a:prstGeom prst="rect">
@@ -5630,162 +7473,6 @@
               </a:rPr>
               <a:t>+</a:t>
             </a:r>
-            <a:br>
-              <a:rPr lang="en-US" sz="1400" dirty="0">
-                <a:solidFill>
-                  <a:schemeClr val="bg1">
-                    <a:lumMod val="50000"/>
-                  </a:schemeClr>
-                </a:solidFill>
-              </a:rPr>
-            </a:br>
-            <a:r>
-              <a:rPr lang="en-US" sz="1400" dirty="0">
-                <a:solidFill>
-                  <a:schemeClr val="bg1">
-                    <a:lumMod val="50000"/>
-                  </a:schemeClr>
-                </a:solidFill>
-              </a:rPr>
-              <a:t>k+1</a:t>
-            </a:r>
-          </a:p>
-        </p:txBody>
-      </p:sp>
-      <p:sp>
-        <p:nvSpPr>
-          <p:cNvPr id="96" name="Textfeld 95">
-            <a:extLst>
-              <a:ext uri="{FF2B5EF4-FFF2-40B4-BE49-F238E27FC236}">
-                <a16:creationId xmlns:a16="http://schemas.microsoft.com/office/drawing/2014/main" id="{6F142F4C-AEBE-BA7C-2963-A89170D3EA89}"/>
-              </a:ext>
-            </a:extLst>
-          </p:cNvPr>
-          <p:cNvSpPr txBox="1"/>
-          <p:nvPr/>
-        </p:nvSpPr>
-        <p:spPr>
-          <a:xfrm>
-            <a:off x="4372044" y="2565328"/>
-            <a:ext cx="561372" cy="523220"/>
-          </a:xfrm>
-          <a:prstGeom prst="rect">
-            <a:avLst/>
-          </a:prstGeom>
-          <a:noFill/>
-        </p:spPr>
-        <p:txBody>
-          <a:bodyPr wrap="none" rtlCol="0">
-            <a:spAutoFit/>
-          </a:bodyPr>
-          <a:lstStyle/>
-          <a:p>
-            <a:pPr algn="ctr"/>
-            <a:r>
-              <a:rPr lang="en-US" sz="1400" dirty="0">
-                <a:solidFill>
-                  <a:schemeClr val="bg1">
-                    <a:lumMod val="50000"/>
-                  </a:schemeClr>
-                </a:solidFill>
-              </a:rPr>
-              <a:t>W</a:t>
-            </a:r>
-            <a:r>
-              <a:rPr lang="en-US" sz="1400" baseline="-25000" dirty="0">
-                <a:solidFill>
-                  <a:schemeClr val="bg1">
-                    <a:lumMod val="50000"/>
-                  </a:schemeClr>
-                </a:solidFill>
-              </a:rPr>
-              <a:t>0</a:t>
-            </a:r>
-            <a:r>
-              <a:rPr lang="en-US" sz="1400" dirty="0">
-                <a:solidFill>
-                  <a:schemeClr val="bg1">
-                    <a:lumMod val="50000"/>
-                  </a:schemeClr>
-                </a:solidFill>
-              </a:rPr>
-              <a:t>+</a:t>
-            </a:r>
-          </a:p>
-          <a:p>
-            <a:pPr algn="ctr"/>
-            <a:r>
-              <a:rPr lang="en-US" sz="1400" dirty="0">
-                <a:solidFill>
-                  <a:schemeClr val="bg1">
-                    <a:lumMod val="50000"/>
-                  </a:schemeClr>
-                </a:solidFill>
-              </a:rPr>
-              <a:t>2k+1</a:t>
-            </a:r>
-          </a:p>
-        </p:txBody>
-      </p:sp>
-      <p:sp>
-        <p:nvSpPr>
-          <p:cNvPr id="97" name="Textfeld 96">
-            <a:extLst>
-              <a:ext uri="{FF2B5EF4-FFF2-40B4-BE49-F238E27FC236}">
-                <a16:creationId xmlns:a16="http://schemas.microsoft.com/office/drawing/2014/main" id="{9C0258DF-4FDF-5554-DFFC-E49F30BDD2DD}"/>
-              </a:ext>
-            </a:extLst>
-          </p:cNvPr>
-          <p:cNvSpPr txBox="1"/>
-          <p:nvPr/>
-        </p:nvSpPr>
-        <p:spPr>
-          <a:xfrm>
-            <a:off x="5253751" y="2562922"/>
-            <a:ext cx="505267" cy="523220"/>
-          </a:xfrm>
-          <a:prstGeom prst="rect">
-            <a:avLst/>
-          </a:prstGeom>
-          <a:noFill/>
-        </p:spPr>
-        <p:txBody>
-          <a:bodyPr wrap="none" rtlCol="0">
-            <a:spAutoFit/>
-          </a:bodyPr>
-          <a:lstStyle/>
-          <a:p>
-            <a:pPr algn="ctr"/>
-            <a:r>
-              <a:rPr lang="en-US" sz="1400" dirty="0">
-                <a:solidFill>
-                  <a:schemeClr val="bg1">
-                    <a:lumMod val="50000"/>
-                  </a:schemeClr>
-                </a:solidFill>
-              </a:rPr>
-              <a:t>W</a:t>
-            </a:r>
-            <a:r>
-              <a:rPr lang="en-US" sz="1400" baseline="-25000" dirty="0">
-                <a:solidFill>
-                  <a:schemeClr val="bg1">
-                    <a:lumMod val="50000"/>
-                  </a:schemeClr>
-                </a:solidFill>
-              </a:rPr>
-              <a:t>0</a:t>
-            </a:r>
-            <a:r>
-              <a:rPr lang="en-US" sz="1400" dirty="0">
-                <a:solidFill>
-                  <a:schemeClr val="bg1">
-                    <a:lumMod val="50000"/>
-                  </a:schemeClr>
-                </a:solidFill>
-              </a:rPr>
-              <a:t>+</a:t>
-            </a:r>
           </a:p>
           <a:p>
             <a:pPr algn="ctr"/>
@@ -5798,81 +7485,6 @@
                 </a:solidFill>
               </a:rPr>
               <a:t>3k</a:t>
-            </a:r>
-          </a:p>
-        </p:txBody>
-      </p:sp>
-      <p:sp>
-        <p:nvSpPr>
-          <p:cNvPr id="98" name="Textfeld 97">
-            <a:extLst>
-              <a:ext uri="{FF2B5EF4-FFF2-40B4-BE49-F238E27FC236}">
-                <a16:creationId xmlns:a16="http://schemas.microsoft.com/office/drawing/2014/main" id="{153C9E40-10C5-29F4-1039-74D965652DA6}"/>
-              </a:ext>
-            </a:extLst>
-          </p:cNvPr>
-          <p:cNvSpPr txBox="1"/>
-          <p:nvPr/>
-        </p:nvSpPr>
-        <p:spPr>
-          <a:xfrm>
-            <a:off x="5677660" y="2549324"/>
-            <a:ext cx="561372" cy="523220"/>
-          </a:xfrm>
-          <a:prstGeom prst="rect">
-            <a:avLst/>
-          </a:prstGeom>
-          <a:noFill/>
-        </p:spPr>
-        <p:txBody>
-          <a:bodyPr wrap="none" rtlCol="0">
-            <a:spAutoFit/>
-          </a:bodyPr>
-          <a:lstStyle/>
-          <a:p>
-            <a:pPr algn="ctr"/>
-            <a:r>
-              <a:rPr lang="en-US" sz="1400" dirty="0">
-                <a:solidFill>
-                  <a:schemeClr val="bg1">
-                    <a:lumMod val="50000"/>
-                  </a:schemeClr>
-                </a:solidFill>
-              </a:rPr>
-              <a:t>W</a:t>
-            </a:r>
-            <a:r>
-              <a:rPr lang="en-US" sz="1400" baseline="-25000" dirty="0">
-                <a:solidFill>
-                  <a:schemeClr val="bg1">
-                    <a:lumMod val="50000"/>
-                  </a:schemeClr>
-                </a:solidFill>
-              </a:rPr>
-              <a:t>0</a:t>
-            </a:r>
-            <a:r>
-              <a:rPr lang="en-US" sz="1400" dirty="0">
-                <a:solidFill>
-                  <a:schemeClr val="bg1">
-                    <a:lumMod val="50000"/>
-                  </a:schemeClr>
-                </a:solidFill>
-              </a:rPr>
-              <a:t>+</a:t>
-            </a:r>
-          </a:p>
-          <a:p>
-            <a:pPr algn="ctr"/>
-            <a:r>
-              <a:rPr lang="en-US" sz="1400" dirty="0">
-                <a:solidFill>
-                  <a:schemeClr val="bg1">
-                    <a:lumMod val="50000"/>
-                  </a:schemeClr>
-                </a:solidFill>
-              </a:rPr>
-              <a:t>3k+1</a:t>
             </a:r>
           </a:p>
         </p:txBody>
@@ -6240,12 +7852,242 @@
           </a:p>
         </p:txBody>
       </p:sp>
-      <p:sp>
-        <p:nvSpPr>
-          <p:cNvPr id="106" name="Textfeld 105">
-            <a:extLst>
-              <a:ext uri="{FF2B5EF4-FFF2-40B4-BE49-F238E27FC236}">
-                <a16:creationId xmlns:a16="http://schemas.microsoft.com/office/drawing/2014/main" id="{694D8EA6-DFAA-EE9C-4D5C-E0A950979715}"/>
+      <mc:AlternateContent xmlns:mc="http://schemas.openxmlformats.org/markup-compatibility/2006">
+        <mc:Choice xmlns:a14="http://schemas.microsoft.com/office/drawing/2010/main" Requires="a14">
+          <p:sp>
+            <p:nvSpPr>
+              <p:cNvPr id="106" name="Textfeld 105">
+                <a:extLst>
+                  <a:ext uri="{FF2B5EF4-FFF2-40B4-BE49-F238E27FC236}">
+                    <a16:creationId xmlns:a16="http://schemas.microsoft.com/office/drawing/2014/main" id="{694D8EA6-DFAA-EE9C-4D5C-E0A950979715}"/>
+                  </a:ext>
+                </a:extLst>
+              </p:cNvPr>
+              <p:cNvSpPr txBox="1"/>
+              <p:nvPr/>
+            </p:nvSpPr>
+            <p:spPr>
+              <a:xfrm>
+                <a:off x="1639712" y="713232"/>
+                <a:ext cx="6753644" cy="1477328"/>
+              </a:xfrm>
+              <a:prstGeom prst="rect">
+                <a:avLst/>
+              </a:prstGeom>
+              <a:noFill/>
+            </p:spPr>
+            <p:txBody>
+              <a:bodyPr wrap="none" rtlCol="0">
+                <a:spAutoFit/>
+              </a:bodyPr>
+              <a:lstStyle/>
+              <a:p>
+                <a14:m>
+                  <m:oMathPara xmlns:m="http://schemas.openxmlformats.org/officeDocument/2006/math">
+                    <m:oMathParaPr>
+                      <m:jc m:val="centerGroup"/>
+                    </m:oMathParaPr>
+                    <m:oMath xmlns:m="http://schemas.openxmlformats.org/officeDocument/2006/math">
+                      <m:r>
+                        <a:rPr lang="de-DE" b="0" i="1" smtClean="0">
+                          <a:latin typeface="Cambria Math" panose="02040503050406030204" pitchFamily="18" charset="0"/>
+                        </a:rPr>
+                        <m:t>𝑘</m:t>
+                      </m:r>
+                      <m:r>
+                        <a:rPr lang="en-US" b="0" i="1" smtClean="0">
+                          <a:latin typeface="Cambria Math" panose="02040503050406030204" pitchFamily="18" charset="0"/>
+                        </a:rPr>
+                        <m:t>&gt;</m:t>
+                      </m:r>
+                      <m:r>
+                        <a:rPr lang="de-DE" b="0" i="1" smtClean="0">
+                          <a:latin typeface="Cambria Math" panose="02040503050406030204" pitchFamily="18" charset="0"/>
+                        </a:rPr>
+                        <m:t>𝑛</m:t>
+                      </m:r>
+                      <m:r>
+                        <a:rPr lang="en-US" b="0" i="1" smtClean="0">
+                          <a:latin typeface="Cambria Math" panose="02040503050406030204" pitchFamily="18" charset="0"/>
+                        </a:rPr>
+                        <m:t>𝜖</m:t>
+                      </m:r>
+                      <m:r>
+                        <a:rPr lang="en-US" b="0" i="1" smtClean="0">
+                          <a:latin typeface="Cambria Math" panose="02040503050406030204" pitchFamily="18" charset="0"/>
+                        </a:rPr>
+                        <m:t>/2</m:t>
+                      </m:r>
+                    </m:oMath>
+                  </m:oMathPara>
+                </a14:m>
+                <a:endParaRPr lang="en-US" dirty="0"/>
+              </a:p>
+              <a:p>
+                <a:endParaRPr lang="en-US" dirty="0"/>
+              </a:p>
+              <a:p>
+                <a:r>
+                  <a:rPr lang="en-US" dirty="0"/>
+                  <a:t>Cost of BLC solution: w</a:t>
+                </a:r>
+                <a:r>
+                  <a:rPr lang="en-US" baseline="-25000" dirty="0"/>
+                  <a:t>0</a:t>
+                </a:r>
+                <a:r>
+                  <a:rPr lang="en-US" dirty="0"/>
+                  <a:t>+nk/2 + 1+</a:t>
+                </a:r>
+                <a14:m>
+                  <m:oMath xmlns:m="http://schemas.openxmlformats.org/officeDocument/2006/math">
+                    <m:r>
+                      <a:rPr lang="en-US" b="0" i="1" smtClean="0">
+                        <a:latin typeface="Cambria Math" panose="02040503050406030204" pitchFamily="18" charset="0"/>
+                      </a:rPr>
+                      <m:t>𝜖</m:t>
+                    </m:r>
+                  </m:oMath>
+                </a14:m>
+                <a:r>
+                  <a:rPr lang="en-US" dirty="0"/>
+                  <a:t>&gt;w</a:t>
+                </a:r>
+                <a:r>
+                  <a:rPr lang="en-US" baseline="-25000" dirty="0"/>
+                  <a:t>0</a:t>
+                </a:r>
+                <a:r>
+                  <a:rPr lang="en-US" dirty="0"/>
+                  <a:t>+nk/2,</a:t>
+                </a:r>
+              </a:p>
+              <a:p>
+                <a:r>
+                  <a:rPr lang="en-US" dirty="0"/>
+                  <a:t>Cost of optimal solution (previous slide)</a:t>
+                </a:r>
+                <a:r>
+                  <a:rPr lang="en-US" dirty="0">
+                    <a:solidFill>
+                      <a:schemeClr val="tx1"/>
+                    </a:solidFill>
+                  </a:rPr>
+                  <a:t>: w</a:t>
+                </a:r>
+                <a:r>
+                  <a:rPr lang="en-US" baseline="-25000" dirty="0">
+                    <a:solidFill>
+                      <a:schemeClr val="tx1"/>
+                    </a:solidFill>
+                  </a:rPr>
+                  <a:t>0</a:t>
+                </a:r>
+                <a:r>
+                  <a:rPr lang="en-US" dirty="0">
+                    <a:solidFill>
+                      <a:schemeClr val="tx1"/>
+                    </a:solidFill>
+                  </a:rPr>
+                  <a:t> + </a:t>
+                </a:r>
+                <a:r>
+                  <a:rPr lang="en-US" sz="1800" dirty="0">
+                    <a:solidFill>
+                      <a:schemeClr val="tx1"/>
+                    </a:solidFill>
+                  </a:rPr>
+                  <a:t>n/2 + k</a:t>
+                </a:r>
+              </a:p>
+              <a:p>
+                <a:r>
+                  <a:rPr lang="en-US" dirty="0"/>
+                  <a:t>For w</a:t>
+                </a:r>
+                <a:r>
+                  <a:rPr lang="en-US" baseline="-25000" dirty="0"/>
+                  <a:t>0</a:t>
+                </a:r>
+                <a:r>
+                  <a:rPr lang="en-US" dirty="0"/>
+                  <a:t>=0: gap to optimality </a:t>
+                </a:r>
+                <a14:m>
+                  <m:oMath xmlns:m="http://schemas.openxmlformats.org/officeDocument/2006/math">
+                    <m:r>
+                      <a:rPr lang="en-US" b="0" i="1" smtClean="0">
+                        <a:latin typeface="Cambria Math" panose="02040503050406030204" pitchFamily="18" charset="0"/>
+                      </a:rPr>
+                      <m:t>≈</m:t>
+                    </m:r>
+                    <m:r>
+                      <a:rPr lang="en-US" b="0" i="1" smtClean="0">
+                        <a:latin typeface="Cambria Math" panose="02040503050406030204" pitchFamily="18" charset="0"/>
+                      </a:rPr>
+                      <m:t>𝑘</m:t>
+                    </m:r>
+                  </m:oMath>
+                </a14:m>
+                <a:r>
+                  <a:rPr lang="en-US" dirty="0"/>
+                  <a:t>, which can become arbitrarily large</a:t>
+                </a:r>
+              </a:p>
+            </p:txBody>
+          </p:sp>
+        </mc:Choice>
+        <mc:Fallback>
+          <p:sp>
+            <p:nvSpPr>
+              <p:cNvPr id="106" name="Textfeld 105">
+                <a:extLst>
+                  <a:ext uri="{FF2B5EF4-FFF2-40B4-BE49-F238E27FC236}">
+                    <a16:creationId xmlns:a16="http://schemas.microsoft.com/office/drawing/2014/main" id="{694D8EA6-DFAA-EE9C-4D5C-E0A950979715}"/>
+                  </a:ext>
+                </a:extLst>
+              </p:cNvPr>
+              <p:cNvSpPr txBox="1">
+                <a:spLocks noRot="1" noChangeAspect="1" noMove="1" noResize="1" noEditPoints="1" noAdjustHandles="1" noChangeArrowheads="1" noChangeShapeType="1" noTextEdit="1"/>
+              </p:cNvSpPr>
+              <p:nvPr/>
+            </p:nvSpPr>
+            <p:spPr>
+              <a:xfrm>
+                <a:off x="1639712" y="713232"/>
+                <a:ext cx="6753644" cy="1477328"/>
+              </a:xfrm>
+              <a:prstGeom prst="rect">
+                <a:avLst/>
+              </a:prstGeom>
+              <a:blipFill>
+                <a:blip r:embed="rId2"/>
+                <a:stretch>
+                  <a:fillRect l="-752" b="-5983"/>
+                </a:stretch>
+              </a:blipFill>
+            </p:spPr>
+            <p:txBody>
+              <a:bodyPr/>
+              <a:lstStyle/>
+              <a:p>
+                <a:r>
+                  <a:rPr lang="en-US">
+                    <a:noFill/>
+                  </a:rPr>
+                  <a:t> </a:t>
+                </a:r>
+              </a:p>
+            </p:txBody>
+          </p:sp>
+        </mc:Fallback>
+      </mc:AlternateContent>
+      <p:sp>
+        <p:nvSpPr>
+          <p:cNvPr id="107" name="Textfeld 106">
+            <a:extLst>
+              <a:ext uri="{FF2B5EF4-FFF2-40B4-BE49-F238E27FC236}">
+                <a16:creationId xmlns:a16="http://schemas.microsoft.com/office/drawing/2014/main" id="{2340123D-FDD5-B119-15BD-4191C8B1DDCB}"/>
               </a:ext>
             </a:extLst>
           </p:cNvPr>
@@ -6254,977 +8096,8 @@
         </p:nvSpPr>
         <p:spPr>
           <a:xfrm>
-            <a:off x="1639712" y="713232"/>
-            <a:ext cx="9309856" cy="923330"/>
-          </a:xfrm>
-          <a:prstGeom prst="rect">
-            <a:avLst/>
-          </a:prstGeom>
-          <a:noFill/>
-        </p:spPr>
-        <p:txBody>
-          <a:bodyPr wrap="none" rtlCol="0">
-            <a:spAutoFit/>
-          </a:bodyPr>
-          <a:lstStyle/>
-          <a:p>
-            <a:r>
-              <a:rPr lang="en-US" dirty="0"/>
-              <a:t>Cost of BLC solution: </a:t>
-            </a:r>
-            <a:r>
-              <a:rPr lang="en-US" dirty="0" err="1"/>
-              <a:t>c+n</a:t>
-            </a:r>
-            <a:r>
-              <a:rPr lang="en-US" dirty="0"/>
-              <a:t>(k+2)/2,</a:t>
-            </a:r>
-          </a:p>
-          <a:p>
-            <a:r>
-              <a:rPr lang="en-US" dirty="0"/>
-              <a:t>Cost of optimal solution (next slide): </a:t>
-            </a:r>
-            <a:r>
-              <a:rPr lang="en-US" dirty="0" err="1"/>
-              <a:t>c+n</a:t>
-            </a:r>
-            <a:r>
-              <a:rPr lang="en-US" dirty="0"/>
-              <a:t>/2</a:t>
-            </a:r>
-          </a:p>
-          <a:p>
-            <a:r>
-              <a:rPr lang="en-US" dirty="0"/>
-              <a:t>For c=0: gap to optimality = k, which can become arbitrarily large if we scale “10” accordingly</a:t>
-            </a:r>
-          </a:p>
-        </p:txBody>
-      </p:sp>
-    </p:spTree>
-    <p:extLst>
-      <p:ext uri="{BB962C8B-B14F-4D97-AF65-F5344CB8AC3E}">
-        <p14:creationId xmlns:p14="http://schemas.microsoft.com/office/powerpoint/2010/main" val="3480336954"/>
-      </p:ext>
-    </p:extLst>
-  </p:cSld>
-  <p:clrMapOvr>
-    <a:masterClrMapping/>
-  </p:clrMapOvr>
-</p:sld>
-</file>
-
-<file path=ppt/slides/slide3.xml><?xml version="1.0" encoding="utf-8"?>
-<p:sld xmlns:a="http://schemas.openxmlformats.org/drawingml/2006/main" xmlns:r="http://schemas.openxmlformats.org/officeDocument/2006/relationships" xmlns:p="http://schemas.openxmlformats.org/presentationml/2006/main">
-  <p:cSld>
-    <p:spTree>
-      <p:nvGrpSpPr>
-        <p:cNvPr id="1" name="">
-          <a:extLst>
-            <a:ext uri="{FF2B5EF4-FFF2-40B4-BE49-F238E27FC236}">
-              <a16:creationId xmlns:a16="http://schemas.microsoft.com/office/drawing/2014/main" id="{716E495B-79F0-21F4-1558-01402EA372C4}"/>
-            </a:ext>
-          </a:extLst>
-        </p:cNvPr>
-        <p:cNvGrpSpPr/>
-        <p:nvPr/>
-      </p:nvGrpSpPr>
-      <p:grpSpPr>
-        <a:xfrm>
-          <a:off x="0" y="0"/>
-          <a:ext cx="0" cy="0"/>
-          <a:chOff x="0" y="0"/>
-          <a:chExt cx="0" cy="0"/>
-        </a:xfrm>
-      </p:grpSpPr>
-      <p:sp>
-        <p:nvSpPr>
-          <p:cNvPr id="9" name="Textfeld 8">
-            <a:extLst>
-              <a:ext uri="{FF2B5EF4-FFF2-40B4-BE49-F238E27FC236}">
-                <a16:creationId xmlns:a16="http://schemas.microsoft.com/office/drawing/2014/main" id="{D7663206-17C1-DDE2-67FC-229238CCA2F4}"/>
-              </a:ext>
-            </a:extLst>
-          </p:cNvPr>
-          <p:cNvSpPr txBox="1"/>
-          <p:nvPr/>
-        </p:nvSpPr>
-        <p:spPr>
-          <a:xfrm>
-            <a:off x="641811" y="3220681"/>
-            <a:ext cx="399468" cy="369332"/>
-          </a:xfrm>
-          <a:prstGeom prst="rect">
-            <a:avLst/>
-          </a:prstGeom>
-          <a:noFill/>
-        </p:spPr>
-        <p:txBody>
-          <a:bodyPr wrap="none" rtlCol="0">
-            <a:spAutoFit/>
-          </a:bodyPr>
-          <a:lstStyle/>
-          <a:p>
-            <a:r>
-              <a:rPr lang="en-US" dirty="0"/>
-              <a:t>P</a:t>
-            </a:r>
-            <a:r>
-              <a:rPr lang="en-US" baseline="-25000" dirty="0"/>
-              <a:t>1</a:t>
-            </a:r>
-          </a:p>
-        </p:txBody>
-      </p:sp>
-      <p:sp>
-        <p:nvSpPr>
-          <p:cNvPr id="10" name="Textfeld 9">
-            <a:extLst>
-              <a:ext uri="{FF2B5EF4-FFF2-40B4-BE49-F238E27FC236}">
-                <a16:creationId xmlns:a16="http://schemas.microsoft.com/office/drawing/2014/main" id="{CF28EB78-3798-A5D5-0D2C-852167246D37}"/>
-              </a:ext>
-            </a:extLst>
-          </p:cNvPr>
-          <p:cNvSpPr txBox="1"/>
-          <p:nvPr/>
-        </p:nvSpPr>
-        <p:spPr>
-          <a:xfrm>
-            <a:off x="641811" y="3994349"/>
-            <a:ext cx="399468" cy="369332"/>
-          </a:xfrm>
-          <a:prstGeom prst="rect">
-            <a:avLst/>
-          </a:prstGeom>
-          <a:noFill/>
-        </p:spPr>
-        <p:txBody>
-          <a:bodyPr wrap="none" rtlCol="0">
-            <a:spAutoFit/>
-          </a:bodyPr>
-          <a:lstStyle/>
-          <a:p>
-            <a:r>
-              <a:rPr lang="en-US" dirty="0"/>
-              <a:t>P</a:t>
-            </a:r>
-            <a:r>
-              <a:rPr lang="en-US" baseline="-25000" dirty="0"/>
-              <a:t>2</a:t>
-            </a:r>
-          </a:p>
-        </p:txBody>
-      </p:sp>
-      <p:sp>
-        <p:nvSpPr>
-          <p:cNvPr id="35" name="Textfeld 34">
-            <a:extLst>
-              <a:ext uri="{FF2B5EF4-FFF2-40B4-BE49-F238E27FC236}">
-                <a16:creationId xmlns:a16="http://schemas.microsoft.com/office/drawing/2014/main" id="{2DBF9201-9FBA-E7B0-58AE-FC544BA5880D}"/>
-              </a:ext>
-            </a:extLst>
-          </p:cNvPr>
-          <p:cNvSpPr txBox="1"/>
-          <p:nvPr/>
-        </p:nvSpPr>
-        <p:spPr>
-          <a:xfrm>
-            <a:off x="1222548" y="3231566"/>
-            <a:ext cx="375946" cy="369332"/>
-          </a:xfrm>
-          <a:prstGeom prst="rect">
-            <a:avLst/>
-          </a:prstGeom>
-          <a:noFill/>
-          <a:ln w="19050">
-            <a:solidFill>
-              <a:schemeClr val="accent1"/>
-            </a:solidFill>
-          </a:ln>
-        </p:spPr>
-        <p:txBody>
-          <a:bodyPr wrap="square" rtlCol="0">
-            <a:spAutoFit/>
-          </a:bodyPr>
-          <a:lstStyle/>
-          <a:p>
-            <a:r>
-              <a:rPr lang="en-US" dirty="0"/>
-              <a:t>T</a:t>
-            </a:r>
-            <a:r>
-              <a:rPr lang="en-US" baseline="-25000" dirty="0"/>
-              <a:t>0</a:t>
-            </a:r>
-          </a:p>
-        </p:txBody>
-      </p:sp>
-      <p:sp>
-        <p:nvSpPr>
-          <p:cNvPr id="37" name="Textfeld 36">
-            <a:extLst>
-              <a:ext uri="{FF2B5EF4-FFF2-40B4-BE49-F238E27FC236}">
-                <a16:creationId xmlns:a16="http://schemas.microsoft.com/office/drawing/2014/main" id="{A3F85C9B-7F50-8A30-A6BF-40E7545158BE}"/>
-              </a:ext>
-            </a:extLst>
-          </p:cNvPr>
-          <p:cNvSpPr txBox="1"/>
-          <p:nvPr/>
-        </p:nvSpPr>
-        <p:spPr>
-          <a:xfrm>
-            <a:off x="2100205" y="3994349"/>
-            <a:ext cx="1238966" cy="369332"/>
-          </a:xfrm>
-          <a:prstGeom prst="rect">
-            <a:avLst/>
-          </a:prstGeom>
-          <a:noFill/>
-          <a:ln w="19050">
-            <a:solidFill>
-              <a:schemeClr val="accent1"/>
-            </a:solidFill>
-          </a:ln>
-        </p:spPr>
-        <p:txBody>
-          <a:bodyPr wrap="square" rtlCol="0">
-            <a:spAutoFit/>
-          </a:bodyPr>
-          <a:lstStyle/>
-          <a:p>
-            <a:r>
-              <a:rPr lang="en-US" dirty="0"/>
-              <a:t>T</a:t>
-            </a:r>
-            <a:r>
-              <a:rPr lang="en-US" baseline="-25000" dirty="0"/>
-              <a:t>1</a:t>
-            </a:r>
-          </a:p>
-        </p:txBody>
-      </p:sp>
-      <p:sp>
-        <p:nvSpPr>
-          <p:cNvPr id="56" name="Textfeld 55">
-            <a:extLst>
-              <a:ext uri="{FF2B5EF4-FFF2-40B4-BE49-F238E27FC236}">
-                <a16:creationId xmlns:a16="http://schemas.microsoft.com/office/drawing/2014/main" id="{08E92D12-00AD-79B5-327A-F13E5593773B}"/>
-              </a:ext>
-            </a:extLst>
-          </p:cNvPr>
-          <p:cNvSpPr txBox="1"/>
-          <p:nvPr/>
-        </p:nvSpPr>
-        <p:spPr>
-          <a:xfrm>
-            <a:off x="641811" y="4768017"/>
-            <a:ext cx="399468" cy="369332"/>
-          </a:xfrm>
-          <a:prstGeom prst="rect">
-            <a:avLst/>
-          </a:prstGeom>
-          <a:noFill/>
-        </p:spPr>
-        <p:txBody>
-          <a:bodyPr wrap="none" rtlCol="0">
-            <a:spAutoFit/>
-          </a:bodyPr>
-          <a:lstStyle/>
-          <a:p>
-            <a:r>
-              <a:rPr lang="en-US" dirty="0"/>
-              <a:t>P</a:t>
-            </a:r>
-            <a:r>
-              <a:rPr lang="en-US" baseline="-25000" dirty="0"/>
-              <a:t>3</a:t>
-            </a:r>
-          </a:p>
-        </p:txBody>
-      </p:sp>
-      <p:sp>
-        <p:nvSpPr>
-          <p:cNvPr id="57" name="Textfeld 56">
-            <a:extLst>
-              <a:ext uri="{FF2B5EF4-FFF2-40B4-BE49-F238E27FC236}">
-                <a16:creationId xmlns:a16="http://schemas.microsoft.com/office/drawing/2014/main" id="{79E783E2-F22E-D6A7-F59F-E76BEC260B7E}"/>
-              </a:ext>
-            </a:extLst>
-          </p:cNvPr>
-          <p:cNvSpPr txBox="1"/>
-          <p:nvPr/>
-        </p:nvSpPr>
-        <p:spPr>
-          <a:xfrm>
-            <a:off x="694003" y="5408931"/>
-            <a:ext cx="399468" cy="369332"/>
-          </a:xfrm>
-          <a:prstGeom prst="rect">
-            <a:avLst/>
-          </a:prstGeom>
-          <a:noFill/>
-        </p:spPr>
-        <p:txBody>
-          <a:bodyPr wrap="none" rtlCol="0">
-            <a:spAutoFit/>
-          </a:bodyPr>
-          <a:lstStyle/>
-          <a:p>
-            <a:r>
-              <a:rPr lang="en-US" dirty="0"/>
-              <a:t>P</a:t>
-            </a:r>
-            <a:r>
-              <a:rPr lang="en-US" baseline="-25000" dirty="0"/>
-              <a:t>4</a:t>
-            </a:r>
-          </a:p>
-        </p:txBody>
-      </p:sp>
-      <p:sp>
-        <p:nvSpPr>
-          <p:cNvPr id="63" name="Textfeld 62">
-            <a:extLst>
-              <a:ext uri="{FF2B5EF4-FFF2-40B4-BE49-F238E27FC236}">
-                <a16:creationId xmlns:a16="http://schemas.microsoft.com/office/drawing/2014/main" id="{5EAAB6E4-11DB-AEDD-C372-E1DCC50248BF}"/>
-              </a:ext>
-            </a:extLst>
-          </p:cNvPr>
-          <p:cNvSpPr txBox="1"/>
-          <p:nvPr/>
-        </p:nvSpPr>
-        <p:spPr>
-          <a:xfrm>
-            <a:off x="1628419" y="3232304"/>
-            <a:ext cx="444876" cy="369332"/>
-          </a:xfrm>
-          <a:prstGeom prst="rect">
-            <a:avLst/>
-          </a:prstGeom>
-          <a:noFill/>
-          <a:ln w="19050">
-            <a:solidFill>
-              <a:schemeClr val="accent1"/>
-            </a:solidFill>
-          </a:ln>
-        </p:spPr>
-        <p:txBody>
-          <a:bodyPr wrap="square" rtlCol="0">
-            <a:spAutoFit/>
-          </a:bodyPr>
-          <a:lstStyle/>
-          <a:p>
-            <a:r>
-              <a:rPr lang="en-US" dirty="0"/>
-              <a:t>T</a:t>
-            </a:r>
-            <a:r>
-              <a:rPr lang="en-US" baseline="-25000" dirty="0"/>
-              <a:t>2</a:t>
-            </a:r>
-          </a:p>
-        </p:txBody>
-      </p:sp>
-      <p:sp>
-        <p:nvSpPr>
-          <p:cNvPr id="64" name="Textfeld 63">
-            <a:extLst>
-              <a:ext uri="{FF2B5EF4-FFF2-40B4-BE49-F238E27FC236}">
-                <a16:creationId xmlns:a16="http://schemas.microsoft.com/office/drawing/2014/main" id="{09C83F45-9E72-B34E-08F3-84228A798839}"/>
-              </a:ext>
-            </a:extLst>
-          </p:cNvPr>
-          <p:cNvSpPr txBox="1"/>
-          <p:nvPr/>
-        </p:nvSpPr>
-        <p:spPr>
-          <a:xfrm>
-            <a:off x="2578114" y="4761125"/>
-            <a:ext cx="1266665" cy="369332"/>
-          </a:xfrm>
-          <a:prstGeom prst="rect">
-            <a:avLst/>
-          </a:prstGeom>
-          <a:noFill/>
-          <a:ln w="19050">
-            <a:solidFill>
-              <a:schemeClr val="accent1"/>
-            </a:solidFill>
-          </a:ln>
-        </p:spPr>
-        <p:txBody>
-          <a:bodyPr wrap="square" rtlCol="0">
-            <a:spAutoFit/>
-          </a:bodyPr>
-          <a:lstStyle/>
-          <a:p>
-            <a:r>
-              <a:rPr lang="en-US" dirty="0"/>
-              <a:t>T</a:t>
-            </a:r>
-            <a:r>
-              <a:rPr lang="en-US" baseline="-25000" dirty="0"/>
-              <a:t>3</a:t>
-            </a:r>
-          </a:p>
-        </p:txBody>
-      </p:sp>
-      <p:sp>
-        <p:nvSpPr>
-          <p:cNvPr id="66" name="Textfeld 65">
-            <a:extLst>
-              <a:ext uri="{FF2B5EF4-FFF2-40B4-BE49-F238E27FC236}">
-                <a16:creationId xmlns:a16="http://schemas.microsoft.com/office/drawing/2014/main" id="{EA6BDC63-0015-DB83-47C9-C90C38900D74}"/>
-              </a:ext>
-            </a:extLst>
-          </p:cNvPr>
-          <p:cNvSpPr txBox="1"/>
-          <p:nvPr/>
-        </p:nvSpPr>
-        <p:spPr>
-          <a:xfrm>
-            <a:off x="2097029" y="3231566"/>
-            <a:ext cx="398488" cy="369332"/>
-          </a:xfrm>
-          <a:prstGeom prst="rect">
-            <a:avLst/>
-          </a:prstGeom>
-          <a:noFill/>
-          <a:ln w="19050">
-            <a:solidFill>
-              <a:schemeClr val="accent1"/>
-            </a:solidFill>
-          </a:ln>
-        </p:spPr>
-        <p:txBody>
-          <a:bodyPr wrap="square" rtlCol="0">
-            <a:spAutoFit/>
-          </a:bodyPr>
-          <a:lstStyle/>
-          <a:p>
-            <a:r>
-              <a:rPr lang="en-US" dirty="0"/>
-              <a:t>T</a:t>
-            </a:r>
-            <a:r>
-              <a:rPr lang="en-US" baseline="-25000" dirty="0"/>
-              <a:t>4</a:t>
-            </a:r>
-          </a:p>
-        </p:txBody>
-      </p:sp>
-      <p:sp>
-        <p:nvSpPr>
-          <p:cNvPr id="67" name="Textfeld 66">
-            <a:extLst>
-              <a:ext uri="{FF2B5EF4-FFF2-40B4-BE49-F238E27FC236}">
-                <a16:creationId xmlns:a16="http://schemas.microsoft.com/office/drawing/2014/main" id="{B407233F-C9B0-91FD-5BFC-0059A08B5A6C}"/>
-              </a:ext>
-            </a:extLst>
-          </p:cNvPr>
-          <p:cNvSpPr txBox="1"/>
-          <p:nvPr/>
-        </p:nvSpPr>
-        <p:spPr>
-          <a:xfrm>
-            <a:off x="3062307" y="5419360"/>
-            <a:ext cx="1230187" cy="369332"/>
-          </a:xfrm>
-          <a:prstGeom prst="rect">
-            <a:avLst/>
-          </a:prstGeom>
-          <a:noFill/>
-          <a:ln w="19050">
-            <a:solidFill>
-              <a:schemeClr val="accent1"/>
-            </a:solidFill>
-          </a:ln>
-        </p:spPr>
-        <p:txBody>
-          <a:bodyPr wrap="square" rtlCol="0">
-            <a:spAutoFit/>
-          </a:bodyPr>
-          <a:lstStyle/>
-          <a:p>
-            <a:r>
-              <a:rPr lang="en-US" dirty="0"/>
-              <a:t>T</a:t>
-            </a:r>
-            <a:r>
-              <a:rPr lang="en-US" baseline="-25000" dirty="0"/>
-              <a:t>5</a:t>
-            </a:r>
-          </a:p>
-        </p:txBody>
-      </p:sp>
-      <p:sp>
-        <p:nvSpPr>
-          <p:cNvPr id="70" name="Textfeld 69">
-            <a:extLst>
-              <a:ext uri="{FF2B5EF4-FFF2-40B4-BE49-F238E27FC236}">
-                <a16:creationId xmlns:a16="http://schemas.microsoft.com/office/drawing/2014/main" id="{63E3A5D8-D97F-51BD-CC07-470D34FED562}"/>
-              </a:ext>
-            </a:extLst>
-          </p:cNvPr>
-          <p:cNvSpPr txBox="1"/>
-          <p:nvPr/>
-        </p:nvSpPr>
-        <p:spPr>
-          <a:xfrm>
-            <a:off x="2517350" y="3231292"/>
-            <a:ext cx="425838" cy="369332"/>
-          </a:xfrm>
-          <a:prstGeom prst="rect">
-            <a:avLst/>
-          </a:prstGeom>
-          <a:noFill/>
-          <a:ln w="19050">
-            <a:solidFill>
-              <a:schemeClr val="accent1"/>
-            </a:solidFill>
-          </a:ln>
-        </p:spPr>
-        <p:txBody>
-          <a:bodyPr wrap="square" rtlCol="0">
-            <a:spAutoFit/>
-          </a:bodyPr>
-          <a:lstStyle/>
-          <a:p>
-            <a:r>
-              <a:rPr lang="en-US" dirty="0"/>
-              <a:t>T</a:t>
-            </a:r>
-            <a:r>
-              <a:rPr lang="en-US" baseline="-25000" dirty="0"/>
-              <a:t>6</a:t>
-            </a:r>
-          </a:p>
-        </p:txBody>
-      </p:sp>
-      <p:cxnSp>
-        <p:nvCxnSpPr>
-          <p:cNvPr id="75" name="Gerade Verbindung 74">
-            <a:extLst>
-              <a:ext uri="{FF2B5EF4-FFF2-40B4-BE49-F238E27FC236}">
-                <a16:creationId xmlns:a16="http://schemas.microsoft.com/office/drawing/2014/main" id="{16465592-2117-EE56-AFDF-43C3FF9B9DAB}"/>
-              </a:ext>
-            </a:extLst>
-          </p:cNvPr>
-          <p:cNvCxnSpPr>
-            <a:cxnSpLocks/>
-          </p:cNvCxnSpPr>
-          <p:nvPr/>
-        </p:nvCxnSpPr>
-        <p:spPr>
-          <a:xfrm flipH="1">
-            <a:off x="1599574" y="3072544"/>
-            <a:ext cx="17208" cy="1291137"/>
-          </a:xfrm>
-          <a:prstGeom prst="line">
-            <a:avLst/>
-          </a:prstGeom>
-          <a:ln>
-            <a:solidFill>
-              <a:schemeClr val="bg1">
-                <a:lumMod val="75000"/>
-              </a:schemeClr>
-            </a:solidFill>
-            <a:prstDash val="sysDash"/>
-          </a:ln>
-        </p:spPr>
-        <p:style>
-          <a:lnRef idx="2">
-            <a:schemeClr val="accent1"/>
-          </a:lnRef>
-          <a:fillRef idx="0">
-            <a:schemeClr val="accent1"/>
-          </a:fillRef>
-          <a:effectRef idx="1">
-            <a:schemeClr val="accent1"/>
-          </a:effectRef>
-          <a:fontRef idx="minor">
-            <a:schemeClr val="tx1"/>
-          </a:fontRef>
-        </p:style>
-      </p:cxnSp>
-      <p:cxnSp>
-        <p:nvCxnSpPr>
-          <p:cNvPr id="83" name="Gerade Verbindung 82">
-            <a:extLst>
-              <a:ext uri="{FF2B5EF4-FFF2-40B4-BE49-F238E27FC236}">
-                <a16:creationId xmlns:a16="http://schemas.microsoft.com/office/drawing/2014/main" id="{B3CBDA3F-4164-E735-1107-A7FFA2F239D0}"/>
-              </a:ext>
-            </a:extLst>
-          </p:cNvPr>
-          <p:cNvCxnSpPr>
-            <a:cxnSpLocks/>
-          </p:cNvCxnSpPr>
-          <p:nvPr/>
-        </p:nvCxnSpPr>
-        <p:spPr>
-          <a:xfrm>
-            <a:off x="4292494" y="3052038"/>
-            <a:ext cx="0" cy="2986126"/>
-          </a:xfrm>
-          <a:prstGeom prst="line">
-            <a:avLst/>
-          </a:prstGeom>
-          <a:ln>
-            <a:solidFill>
-              <a:schemeClr val="bg1">
-                <a:lumMod val="75000"/>
-              </a:schemeClr>
-            </a:solidFill>
-            <a:prstDash val="sysDash"/>
-          </a:ln>
-        </p:spPr>
-        <p:style>
-          <a:lnRef idx="2">
-            <a:schemeClr val="accent1"/>
-          </a:lnRef>
-          <a:fillRef idx="0">
-            <a:schemeClr val="accent1"/>
-          </a:fillRef>
-          <a:effectRef idx="1">
-            <a:schemeClr val="accent1"/>
-          </a:effectRef>
-          <a:fontRef idx="minor">
-            <a:schemeClr val="tx1"/>
-          </a:fontRef>
-        </p:style>
-      </p:cxnSp>
-      <p:sp>
-        <p:nvSpPr>
-          <p:cNvPr id="84" name="Textfeld 83">
-            <a:extLst>
-              <a:ext uri="{FF2B5EF4-FFF2-40B4-BE49-F238E27FC236}">
-                <a16:creationId xmlns:a16="http://schemas.microsoft.com/office/drawing/2014/main" id="{8CCA8950-1ADD-BF27-B537-58AB6C25B9C8}"/>
-              </a:ext>
-            </a:extLst>
-          </p:cNvPr>
-          <p:cNvSpPr txBox="1"/>
-          <p:nvPr/>
-        </p:nvSpPr>
-        <p:spPr>
-          <a:xfrm>
-            <a:off x="1413522" y="2713484"/>
-            <a:ext cx="405880" cy="338554"/>
-          </a:xfrm>
-          <a:prstGeom prst="rect">
-            <a:avLst/>
-          </a:prstGeom>
-          <a:noFill/>
-        </p:spPr>
-        <p:txBody>
-          <a:bodyPr wrap="none" rtlCol="0">
-            <a:spAutoFit/>
-          </a:bodyPr>
-          <a:lstStyle/>
-          <a:p>
-            <a:r>
-              <a:rPr lang="en-US" sz="1600" dirty="0">
-                <a:solidFill>
-                  <a:schemeClr val="bg1">
-                    <a:lumMod val="50000"/>
-                  </a:schemeClr>
-                </a:solidFill>
-              </a:rPr>
-              <a:t>w</a:t>
-            </a:r>
-            <a:r>
-              <a:rPr lang="en-US" sz="1600" baseline="-25000" dirty="0">
-                <a:solidFill>
-                  <a:schemeClr val="bg1">
-                    <a:lumMod val="50000"/>
-                  </a:schemeClr>
-                </a:solidFill>
-              </a:rPr>
-              <a:t>0</a:t>
-            </a:r>
-          </a:p>
-        </p:txBody>
-      </p:sp>
-      <p:sp>
-        <p:nvSpPr>
-          <p:cNvPr id="99" name="Oval 98">
-            <a:extLst>
-              <a:ext uri="{FF2B5EF4-FFF2-40B4-BE49-F238E27FC236}">
-                <a16:creationId xmlns:a16="http://schemas.microsoft.com/office/drawing/2014/main" id="{03C2302A-8976-2ACB-7B88-D88F110C415B}"/>
-              </a:ext>
-            </a:extLst>
-          </p:cNvPr>
-          <p:cNvSpPr/>
-          <p:nvPr/>
-        </p:nvSpPr>
-        <p:spPr>
-          <a:xfrm>
-            <a:off x="3084723" y="3384840"/>
-            <a:ext cx="108857" cy="91744"/>
-          </a:xfrm>
-          <a:prstGeom prst="ellipse">
-            <a:avLst/>
-          </a:prstGeom>
-        </p:spPr>
-        <p:style>
-          <a:lnRef idx="2">
-            <a:schemeClr val="accent1">
-              <a:shade val="15000"/>
-            </a:schemeClr>
-          </a:lnRef>
-          <a:fillRef idx="1">
-            <a:schemeClr val="accent1"/>
-          </a:fillRef>
-          <a:effectRef idx="0">
-            <a:schemeClr val="accent1"/>
-          </a:effectRef>
-          <a:fontRef idx="minor">
-            <a:schemeClr val="lt1"/>
-          </a:fontRef>
-        </p:style>
-        <p:txBody>
-          <a:bodyPr rtlCol="0" anchor="ctr"/>
-          <a:lstStyle/>
-          <a:p>
-            <a:pPr algn="ctr"/>
-            <a:endParaRPr lang="en-US"/>
-          </a:p>
-        </p:txBody>
-      </p:sp>
-      <p:sp>
-        <p:nvSpPr>
-          <p:cNvPr id="100" name="Oval 99">
-            <a:extLst>
-              <a:ext uri="{FF2B5EF4-FFF2-40B4-BE49-F238E27FC236}">
-                <a16:creationId xmlns:a16="http://schemas.microsoft.com/office/drawing/2014/main" id="{0470DA89-9357-A0C7-8702-90C8E21B0246}"/>
-              </a:ext>
-            </a:extLst>
-          </p:cNvPr>
-          <p:cNvSpPr/>
-          <p:nvPr/>
-        </p:nvSpPr>
-        <p:spPr>
-          <a:xfrm>
-            <a:off x="3291553" y="3384841"/>
-            <a:ext cx="108857" cy="91744"/>
-          </a:xfrm>
-          <a:prstGeom prst="ellipse">
-            <a:avLst/>
-          </a:prstGeom>
-        </p:spPr>
-        <p:style>
-          <a:lnRef idx="2">
-            <a:schemeClr val="accent1">
-              <a:shade val="15000"/>
-            </a:schemeClr>
-          </a:lnRef>
-          <a:fillRef idx="1">
-            <a:schemeClr val="accent1"/>
-          </a:fillRef>
-          <a:effectRef idx="0">
-            <a:schemeClr val="accent1"/>
-          </a:effectRef>
-          <a:fontRef idx="minor">
-            <a:schemeClr val="lt1"/>
-          </a:fontRef>
-        </p:style>
-        <p:txBody>
-          <a:bodyPr rtlCol="0" anchor="ctr"/>
-          <a:lstStyle/>
-          <a:p>
-            <a:pPr algn="ctr"/>
-            <a:endParaRPr lang="en-US"/>
-          </a:p>
-        </p:txBody>
-      </p:sp>
-      <p:sp>
-        <p:nvSpPr>
-          <p:cNvPr id="101" name="Oval 100">
-            <a:extLst>
-              <a:ext uri="{FF2B5EF4-FFF2-40B4-BE49-F238E27FC236}">
-                <a16:creationId xmlns:a16="http://schemas.microsoft.com/office/drawing/2014/main" id="{8BABA199-E33B-2625-F8FA-5F489D02E625}"/>
-              </a:ext>
-            </a:extLst>
-          </p:cNvPr>
-          <p:cNvSpPr/>
-          <p:nvPr/>
-        </p:nvSpPr>
-        <p:spPr>
-          <a:xfrm>
-            <a:off x="3498383" y="3384841"/>
-            <a:ext cx="108857" cy="91744"/>
-          </a:xfrm>
-          <a:prstGeom prst="ellipse">
-            <a:avLst/>
-          </a:prstGeom>
-        </p:spPr>
-        <p:style>
-          <a:lnRef idx="2">
-            <a:schemeClr val="accent1">
-              <a:shade val="15000"/>
-            </a:schemeClr>
-          </a:lnRef>
-          <a:fillRef idx="1">
-            <a:schemeClr val="accent1"/>
-          </a:fillRef>
-          <a:effectRef idx="0">
-            <a:schemeClr val="accent1"/>
-          </a:effectRef>
-          <a:fontRef idx="minor">
-            <a:schemeClr val="lt1"/>
-          </a:fontRef>
-        </p:style>
-        <p:txBody>
-          <a:bodyPr rtlCol="0" anchor="ctr"/>
-          <a:lstStyle/>
-          <a:p>
-            <a:pPr algn="ctr"/>
-            <a:endParaRPr lang="en-US"/>
-          </a:p>
-        </p:txBody>
-      </p:sp>
-      <p:sp>
-        <p:nvSpPr>
-          <p:cNvPr id="104" name="Textfeld 103">
-            <a:extLst>
-              <a:ext uri="{FF2B5EF4-FFF2-40B4-BE49-F238E27FC236}">
-                <a16:creationId xmlns:a16="http://schemas.microsoft.com/office/drawing/2014/main" id="{012602C2-E629-3C71-7540-762DBE1B9BEC}"/>
-              </a:ext>
-            </a:extLst>
-          </p:cNvPr>
-          <p:cNvSpPr txBox="1"/>
-          <p:nvPr/>
-        </p:nvSpPr>
-        <p:spPr>
-          <a:xfrm>
-            <a:off x="4039860" y="2553010"/>
-            <a:ext cx="505267" cy="523220"/>
-          </a:xfrm>
-          <a:prstGeom prst="rect">
-            <a:avLst/>
-          </a:prstGeom>
-          <a:noFill/>
-        </p:spPr>
-        <p:txBody>
-          <a:bodyPr wrap="none" rtlCol="0">
-            <a:spAutoFit/>
-          </a:bodyPr>
-          <a:lstStyle/>
-          <a:p>
-            <a:pPr algn="ctr"/>
-            <a:r>
-              <a:rPr lang="en-US" sz="1400" dirty="0">
-                <a:solidFill>
-                  <a:schemeClr val="bg1">
-                    <a:lumMod val="50000"/>
-                  </a:schemeClr>
-                </a:solidFill>
-              </a:rPr>
-              <a:t>W</a:t>
-            </a:r>
-            <a:r>
-              <a:rPr lang="en-US" sz="1400" baseline="-25000" dirty="0">
-                <a:solidFill>
-                  <a:schemeClr val="bg1">
-                    <a:lumMod val="50000"/>
-                  </a:schemeClr>
-                </a:solidFill>
-              </a:rPr>
-              <a:t>0</a:t>
-            </a:r>
-            <a:r>
-              <a:rPr lang="en-US" sz="1400" dirty="0">
-                <a:solidFill>
-                  <a:schemeClr val="bg1">
-                    <a:lumMod val="50000"/>
-                  </a:schemeClr>
-                </a:solidFill>
-              </a:rPr>
-              <a:t>+</a:t>
-            </a:r>
-            <a:br>
-              <a:rPr lang="en-US" sz="1400" dirty="0">
-                <a:solidFill>
-                  <a:schemeClr val="bg1">
-                    <a:lumMod val="50000"/>
-                  </a:schemeClr>
-                </a:solidFill>
-              </a:rPr>
-            </a:br>
-            <a:r>
-              <a:rPr lang="en-US" sz="1400" dirty="0">
-                <a:solidFill>
-                  <a:schemeClr val="bg1">
-                    <a:lumMod val="50000"/>
-                  </a:schemeClr>
-                </a:solidFill>
-              </a:rPr>
-              <a:t>n/2</a:t>
-            </a:r>
-          </a:p>
-        </p:txBody>
-      </p:sp>
-      <p:sp>
-        <p:nvSpPr>
-          <p:cNvPr id="105" name="Textfeld 104">
-            <a:extLst>
-              <a:ext uri="{FF2B5EF4-FFF2-40B4-BE49-F238E27FC236}">
-                <a16:creationId xmlns:a16="http://schemas.microsoft.com/office/drawing/2014/main" id="{695838A0-C57D-B1BF-F654-965BF7540703}"/>
-              </a:ext>
-            </a:extLst>
-          </p:cNvPr>
-          <p:cNvSpPr txBox="1"/>
-          <p:nvPr/>
-        </p:nvSpPr>
-        <p:spPr>
-          <a:xfrm>
-            <a:off x="3872746" y="3220681"/>
-            <a:ext cx="396014" cy="369332"/>
-          </a:xfrm>
-          <a:prstGeom prst="rect">
-            <a:avLst/>
-          </a:prstGeom>
-          <a:noFill/>
-          <a:ln w="19050">
-            <a:solidFill>
-              <a:schemeClr val="accent1"/>
-            </a:solidFill>
-          </a:ln>
-        </p:spPr>
-        <p:txBody>
-          <a:bodyPr wrap="square" rtlCol="0">
-            <a:spAutoFit/>
-          </a:bodyPr>
-          <a:lstStyle/>
-          <a:p>
-            <a:r>
-              <a:rPr lang="en-US" dirty="0"/>
-              <a:t>T</a:t>
-            </a:r>
-            <a:r>
-              <a:rPr lang="en-US" baseline="-25000" dirty="0"/>
-              <a:t>n</a:t>
-            </a:r>
-          </a:p>
-        </p:txBody>
-      </p:sp>
-      <p:sp>
-        <p:nvSpPr>
-          <p:cNvPr id="2" name="Textfeld 1">
-            <a:extLst>
-              <a:ext uri="{FF2B5EF4-FFF2-40B4-BE49-F238E27FC236}">
-                <a16:creationId xmlns:a16="http://schemas.microsoft.com/office/drawing/2014/main" id="{83E7E11F-EAB4-6B6C-48AE-E5DA0EC966A7}"/>
-              </a:ext>
-            </a:extLst>
-          </p:cNvPr>
-          <p:cNvSpPr txBox="1"/>
-          <p:nvPr/>
-        </p:nvSpPr>
-        <p:spPr>
-          <a:xfrm>
-            <a:off x="1612942" y="3994349"/>
-            <a:ext cx="484087" cy="369332"/>
+            <a:off x="6849002" y="5952358"/>
+            <a:ext cx="1305619" cy="369332"/>
           </a:xfrm>
           <a:prstGeom prst="rect">
             <a:avLst/>
@@ -7249,97 +8122,7 @@
             </a:r>
             <a:r>
               <a:rPr lang="en-US" baseline="-25000" dirty="0"/>
-              <a:t>01</a:t>
-            </a:r>
-          </a:p>
-        </p:txBody>
-      </p:sp>
-      <p:sp>
-        <p:nvSpPr>
-          <p:cNvPr id="3" name="Textfeld 2">
-            <a:extLst>
-              <a:ext uri="{FF2B5EF4-FFF2-40B4-BE49-F238E27FC236}">
-                <a16:creationId xmlns:a16="http://schemas.microsoft.com/office/drawing/2014/main" id="{4F5E101B-4C60-A0B0-72B5-EB5253411B4E}"/>
-              </a:ext>
-            </a:extLst>
-          </p:cNvPr>
-          <p:cNvSpPr txBox="1"/>
-          <p:nvPr/>
-        </p:nvSpPr>
-        <p:spPr>
-          <a:xfrm>
-            <a:off x="2098125" y="4750622"/>
-            <a:ext cx="471651" cy="369332"/>
-          </a:xfrm>
-          <a:prstGeom prst="rect">
-            <a:avLst/>
-          </a:prstGeom>
-          <a:noFill/>
-          <a:ln>
-            <a:solidFill>
-              <a:schemeClr val="accent1"/>
-            </a:solidFill>
-            <a:prstDash val="dash"/>
-          </a:ln>
-        </p:spPr>
-        <p:txBody>
-          <a:bodyPr wrap="square" rtlCol="0">
-            <a:spAutoFit/>
-          </a:bodyPr>
-          <a:lstStyle/>
-          <a:p>
-            <a:r>
-              <a:rPr lang="en-US" dirty="0"/>
-              <a:t>c</a:t>
-            </a:r>
-            <a:r>
-              <a:rPr lang="en-US" baseline="-25000" dirty="0"/>
-              <a:t>03</a:t>
-            </a:r>
-          </a:p>
-        </p:txBody>
-      </p:sp>
-      <p:sp>
-        <p:nvSpPr>
-          <p:cNvPr id="4" name="Textfeld 3">
-            <a:extLst>
-              <a:ext uri="{FF2B5EF4-FFF2-40B4-BE49-F238E27FC236}">
-                <a16:creationId xmlns:a16="http://schemas.microsoft.com/office/drawing/2014/main" id="{9E379A0F-8FE1-7B94-DA77-2BF211D57B35}"/>
-              </a:ext>
-            </a:extLst>
-          </p:cNvPr>
-          <p:cNvSpPr txBox="1"/>
-          <p:nvPr/>
-        </p:nvSpPr>
-        <p:spPr>
-          <a:xfrm>
-            <a:off x="2580098" y="5402588"/>
-            <a:ext cx="471651" cy="369332"/>
-          </a:xfrm>
-          <a:prstGeom prst="rect">
-            <a:avLst/>
-          </a:prstGeom>
-          <a:noFill/>
-          <a:ln>
-            <a:solidFill>
-              <a:schemeClr val="accent1"/>
-            </a:solidFill>
-            <a:prstDash val="dash"/>
-          </a:ln>
-        </p:spPr>
-        <p:txBody>
-          <a:bodyPr wrap="square" rtlCol="0">
-            <a:spAutoFit/>
-          </a:bodyPr>
-          <a:lstStyle/>
-          <a:p>
-            <a:r>
-              <a:rPr lang="en-US" dirty="0"/>
-              <a:t>c</a:t>
-            </a:r>
-            <a:r>
-              <a:rPr lang="en-US" baseline="-25000" dirty="0"/>
-              <a:t>05</a:t>
+              <a:t>0n</a:t>
             </a:r>
           </a:p>
         </p:txBody>
@@ -7347,7 +8130,7 @@
     </p:spTree>
     <p:extLst>
       <p:ext uri="{BB962C8B-B14F-4D97-AF65-F5344CB8AC3E}">
-        <p14:creationId xmlns:p14="http://schemas.microsoft.com/office/powerpoint/2010/main" val="1098037093"/>
+        <p14:creationId xmlns:p14="http://schemas.microsoft.com/office/powerpoint/2010/main" val="3480336954"/>
       </p:ext>
     </p:extLst>
   </p:cSld>

</xml_diff>